<commit_message>
LOC xong phan Slide va Bao cao
Da sua silde 5 mau slide phan Observer bs va bao cao
</commit_message>
<xml_diff>
--- a/SEMINAR_5_PatternsDichSach.pptx
+++ b/SEMINAR_5_PatternsDichSach.pptx
@@ -368,7 +368,7 @@
           <a:p>
             <a:fld id="{48D9F865-DE9D-469D-B54C-8E34BEAD4343}" type="datetimeFigureOut">
               <a:rPr lang="en-GB" smtClean="0"/>
-              <a:t>08/01/2017</a:t>
+              <a:t>12/01/2017</a:t>
             </a:fld>
             <a:endParaRPr lang="en-GB"/>
           </a:p>
@@ -8532,7 +8532,7 @@
           <a:p>
             <a:fld id="{E392035F-EBBE-4BB8-8C17-857BB5007D3A}" type="datetimeFigureOut">
               <a:rPr lang="en-US" smtClean="0"/>
-              <a:t>08-Jan-17</a:t>
+              <a:t>1/12/2017</a:t>
             </a:fld>
             <a:endParaRPr lang="en-US"/>
           </a:p>
@@ -8700,7 +8700,7 @@
           <a:p>
             <a:fld id="{E392035F-EBBE-4BB8-8C17-857BB5007D3A}" type="datetimeFigureOut">
               <a:rPr lang="en-US" smtClean="0"/>
-              <a:t>08-Jan-17</a:t>
+              <a:t>1/12/2017</a:t>
             </a:fld>
             <a:endParaRPr lang="en-US"/>
           </a:p>
@@ -8878,7 +8878,7 @@
           <a:p>
             <a:fld id="{E392035F-EBBE-4BB8-8C17-857BB5007D3A}" type="datetimeFigureOut">
               <a:rPr lang="en-US" smtClean="0"/>
-              <a:t>08-Jan-17</a:t>
+              <a:t>1/12/2017</a:t>
             </a:fld>
             <a:endParaRPr lang="en-US"/>
           </a:p>
@@ -9046,7 +9046,7 @@
           <a:p>
             <a:fld id="{E392035F-EBBE-4BB8-8C17-857BB5007D3A}" type="datetimeFigureOut">
               <a:rPr lang="en-US" smtClean="0"/>
-              <a:t>08-Jan-17</a:t>
+              <a:t>1/12/2017</a:t>
             </a:fld>
             <a:endParaRPr lang="en-US"/>
           </a:p>
@@ -9291,7 +9291,7 @@
           <a:p>
             <a:fld id="{E392035F-EBBE-4BB8-8C17-857BB5007D3A}" type="datetimeFigureOut">
               <a:rPr lang="en-US" smtClean="0"/>
-              <a:t>08-Jan-17</a:t>
+              <a:t>1/12/2017</a:t>
             </a:fld>
             <a:endParaRPr lang="en-US"/>
           </a:p>
@@ -9520,7 +9520,7 @@
           <a:p>
             <a:fld id="{E392035F-EBBE-4BB8-8C17-857BB5007D3A}" type="datetimeFigureOut">
               <a:rPr lang="en-US" smtClean="0"/>
-              <a:t>08-Jan-17</a:t>
+              <a:t>1/12/2017</a:t>
             </a:fld>
             <a:endParaRPr lang="en-US"/>
           </a:p>
@@ -9884,7 +9884,7 @@
           <a:p>
             <a:fld id="{E392035F-EBBE-4BB8-8C17-857BB5007D3A}" type="datetimeFigureOut">
               <a:rPr lang="en-US" smtClean="0"/>
-              <a:t>08-Jan-17</a:t>
+              <a:t>1/12/2017</a:t>
             </a:fld>
             <a:endParaRPr lang="en-US"/>
           </a:p>
@@ -10001,7 +10001,7 @@
           <a:p>
             <a:fld id="{E392035F-EBBE-4BB8-8C17-857BB5007D3A}" type="datetimeFigureOut">
               <a:rPr lang="en-US" smtClean="0"/>
-              <a:t>08-Jan-17</a:t>
+              <a:t>1/12/2017</a:t>
             </a:fld>
             <a:endParaRPr lang="en-US"/>
           </a:p>
@@ -10096,7 +10096,7 @@
           <a:p>
             <a:fld id="{E392035F-EBBE-4BB8-8C17-857BB5007D3A}" type="datetimeFigureOut">
               <a:rPr lang="en-US" smtClean="0"/>
-              <a:t>08-Jan-17</a:t>
+              <a:t>1/12/2017</a:t>
             </a:fld>
             <a:endParaRPr lang="en-US"/>
           </a:p>
@@ -10371,7 +10371,7 @@
           <a:p>
             <a:fld id="{E392035F-EBBE-4BB8-8C17-857BB5007D3A}" type="datetimeFigureOut">
               <a:rPr lang="en-US" smtClean="0"/>
-              <a:t>08-Jan-17</a:t>
+              <a:t>1/12/2017</a:t>
             </a:fld>
             <a:endParaRPr lang="en-US"/>
           </a:p>
@@ -10623,7 +10623,7 @@
           <a:p>
             <a:fld id="{E392035F-EBBE-4BB8-8C17-857BB5007D3A}" type="datetimeFigureOut">
               <a:rPr lang="en-US" smtClean="0"/>
-              <a:t>08-Jan-17</a:t>
+              <a:t>1/12/2017</a:t>
             </a:fld>
             <a:endParaRPr lang="en-US"/>
           </a:p>
@@ -10834,7 +10834,7 @@
           <a:p>
             <a:fld id="{E392035F-EBBE-4BB8-8C17-857BB5007D3A}" type="datetimeFigureOut">
               <a:rPr lang="en-US" smtClean="0"/>
-              <a:t>08-Jan-17</a:t>
+              <a:t>1/12/2017</a:t>
             </a:fld>
             <a:endParaRPr lang="en-US"/>
           </a:p>
@@ -12590,7 +12590,7 @@
               <a:buChar char="Ø"/>
             </a:pPr>
             <a:r>
-              <a:rPr lang="VI-VN" sz="3200" dirty="0">
+              <a:rPr lang="vi-VN" sz="3200" dirty="0">
                 <a:latin typeface="+mj-lt"/>
               </a:rPr>
               <a:t>Khi</a:t>
@@ -12609,7 +12609,7 @@
               <a:t>có</a:t>
             </a:r>
             <a:r>
-              <a:rPr lang="VI-VN" sz="3200" dirty="0">
+              <a:rPr lang="vi-VN" sz="3200" dirty="0">
                 <a:latin typeface="+mj-lt"/>
               </a:rPr>
               <a:t> một sự phụ thuộc của một hoặc nhiều đối tượng vào 1 đối tượng khác.</a:t>
@@ -12624,7 +12624,7 @@
               <a:buChar char="Ø"/>
             </a:pPr>
             <a:r>
-              <a:rPr lang="VI-VN" sz="3200" dirty="0">
+              <a:rPr lang="vi-VN" sz="3200" dirty="0">
                 <a:latin typeface="+mj-lt"/>
               </a:rPr>
               <a:t>Khi sự thay đổi của một đối tượng này đòi hỏi phải thay đổi đối tượng khác.</a:t>
@@ -12636,10 +12636,14 @@
               <a:buChar char="Ø"/>
             </a:pPr>
             <a:r>
-              <a:rPr lang="VI-VN" sz="3200" dirty="0">
+              <a:rPr lang="vi-VN" sz="3200" dirty="0">
                 <a:latin typeface="+mj-lt"/>
               </a:rPr>
               <a:t> Khi một đối tượng có khả năng thông báo cho các đối tượng khác mà không làm thay đổi cấu trúc bên trong của các đối tượng </a:t>
+            </a:r>
+            <a:r>
+              <a:rPr lang="vi-VN" sz="3200" dirty="0"/>
+              <a:t/>
             </a:r>
             <a:br>
               <a:rPr lang="vi-VN" sz="3200" dirty="0"/>
@@ -14138,13 +14142,13 @@
               <a:buChar char="Ø"/>
             </a:pPr>
             <a:r>
-              <a:rPr lang="VI-VN" sz="3200" dirty="0">
+              <a:rPr lang="vi-VN" sz="3200" dirty="0">
                 <a:latin typeface="+mj-lt"/>
               </a:rPr>
               <a:t>Subject không cần biết các Observer được tạo ra như thế nào chỉ cần các Observer hiện thực được interface có phương thức cập nhật(Update) là được</a:t>
             </a:r>
             <a:r>
-              <a:rPr lang="EN-GB" sz="3200" dirty="0">
+              <a:rPr lang="en-GB" sz="3200" dirty="0">
                 <a:latin typeface="+mj-lt"/>
               </a:rPr>
               <a:t>.</a:t>
@@ -14156,7 +14160,7 @@
               <a:buChar char="Ø"/>
             </a:pPr>
             <a:r>
-              <a:rPr lang="VI-VN" sz="3200" dirty="0">
+              <a:rPr lang="vi-VN" sz="3200" dirty="0">
                 <a:latin typeface="+mj-lt"/>
               </a:rPr>
               <a:t>Subject và Observer có thể thuộc về các layer khác nhau( Model-View). </a:t>
@@ -14168,7 +14172,7 @@
               <a:buChar char="Ø"/>
             </a:pPr>
             <a:r>
-              <a:rPr lang="VI-VN" sz="3200" dirty="0">
+              <a:rPr lang="vi-VN" sz="3200" dirty="0">
                 <a:latin typeface="+mj-lt"/>
               </a:rPr>
               <a:t>Subject gửi thông báo đến tất cả các đối tượng observer đã được đăng kí</a:t>
@@ -14180,7 +14184,7 @@
               <a:t>.</a:t>
             </a:r>
             <a:r>
-              <a:rPr lang="VI-VN" sz="3200" dirty="0">
+              <a:rPr lang="vi-VN" sz="3200" dirty="0">
                 <a:latin typeface="+mj-lt"/>
               </a:rPr>
               <a:t> Các observer có thể được thêm và xóa bất cứ lúc nào.</a:t>
@@ -15006,6 +15010,12 @@
           </a:bodyPr>
           <a:lstStyle/>
           <a:p>
+            <a:r>
+              <a:rPr lang="vi-VN" sz="3200" dirty="0">
+                <a:latin typeface="+mj-lt"/>
+              </a:rPr>
+              <a:t/>
+            </a:r>
             <a:br>
               <a:rPr lang="vi-VN" sz="3200" dirty="0">
                 <a:latin typeface="+mj-lt"/>
@@ -21102,60 +21112,6 @@
           </a:p>
         </p:txBody>
       </p:sp>
-      <p:pic>
-        <p:nvPicPr>
-          <p:cNvPr id="1027" name="Picture 3" descr="Untitled"/>
-          <p:cNvPicPr>
-            <a:picLocks noChangeAspect="1" noChangeArrowheads="1"/>
-          </p:cNvPicPr>
-          <p:nvPr/>
-        </p:nvPicPr>
-        <p:blipFill>
-          <a:blip r:embed="rId3">
-            <a:extLst>
-              <a:ext uri="{28A0092B-C50C-407E-A947-70E740481C1C}">
-                <a14:useLocalDpi xmlns:a14="http://schemas.microsoft.com/office/drawing/2010/main" val="0"/>
-              </a:ext>
-            </a:extLst>
-          </a:blip>
-          <a:srcRect/>
-          <a:stretch>
-            <a:fillRect/>
-          </a:stretch>
-        </p:blipFill>
-        <p:spPr bwMode="auto">
-          <a:xfrm>
-            <a:off x="938880" y="2603989"/>
-            <a:ext cx="9635184" cy="4060282"/>
-          </a:xfrm>
-          <a:prstGeom prst="rect">
-            <a:avLst/>
-          </a:prstGeom>
-          <a:noFill/>
-          <a:ln>
-            <a:noFill/>
-          </a:ln>
-          <a:extLst>
-            <a:ext uri="{909E8E84-426E-40DD-AFC4-6F175D3DCCD1}">
-              <a14:hiddenFill xmlns:a14="http://schemas.microsoft.com/office/drawing/2010/main">
-                <a:solidFill>
-                  <a:srgbClr val="FFFFFF"/>
-                </a:solidFill>
-              </a14:hiddenFill>
-            </a:ext>
-            <a:ext uri="{91240B29-F687-4F45-9708-019B960494DF}">
-              <a14:hiddenLine xmlns:a14="http://schemas.microsoft.com/office/drawing/2010/main" w="9525">
-                <a:solidFill>
-                  <a:srgbClr val="000000"/>
-                </a:solidFill>
-                <a:miter lim="800000"/>
-                <a:headEnd/>
-                <a:tailEnd/>
-              </a14:hiddenLine>
-            </a:ext>
-          </a:extLst>
-        </p:spPr>
-      </p:pic>
       <p:sp>
         <p:nvSpPr>
           <p:cNvPr id="9" name="Rectangle 8"/>
@@ -21213,6 +21169,483 @@
               <a:t>:</a:t>
             </a:r>
             <a:endParaRPr lang="en-GB" sz="3200" dirty="0">
+              <a:latin typeface="Times New Roman" panose="02020603050405020304" pitchFamily="18" charset="0"/>
+              <a:cs typeface="Times New Roman" panose="02020603050405020304" pitchFamily="18" charset="0"/>
+            </a:endParaRPr>
+          </a:p>
+        </p:txBody>
+      </p:sp>
+      <p:sp>
+        <p:nvSpPr>
+          <p:cNvPr id="6" name="Rectangle 5"/>
+          <p:cNvSpPr/>
+          <p:nvPr/>
+        </p:nvSpPr>
+        <p:spPr>
+          <a:xfrm>
+            <a:off x="757644" y="2603989"/>
+            <a:ext cx="5566956" cy="3785652"/>
+          </a:xfrm>
+          <a:prstGeom prst="rect">
+            <a:avLst/>
+          </a:prstGeom>
+        </p:spPr>
+        <p:txBody>
+          <a:bodyPr wrap="square">
+            <a:spAutoFit/>
+          </a:bodyPr>
+          <a:lstStyle/>
+          <a:p>
+            <a:r>
+              <a:rPr lang="en-US" sz="1600" b="1" dirty="0">
+                <a:solidFill>
+                  <a:srgbClr val="7F0055"/>
+                </a:solidFill>
+                <a:latin typeface="Times New Roman" panose="02020603050405020304" pitchFamily="18" charset="0"/>
+                <a:cs typeface="Times New Roman" panose="02020603050405020304" pitchFamily="18" charset="0"/>
+              </a:rPr>
+              <a:t>class</a:t>
+            </a:r>
+            <a:r>
+              <a:rPr lang="en-US" sz="1600" b="1" dirty="0">
+                <a:solidFill>
+                  <a:srgbClr val="000000"/>
+                </a:solidFill>
+                <a:latin typeface="Times New Roman" panose="02020603050405020304" pitchFamily="18" charset="0"/>
+                <a:cs typeface="Times New Roman" panose="02020603050405020304" pitchFamily="18" charset="0"/>
+              </a:rPr>
+              <a:t> Observer</a:t>
+            </a:r>
+          </a:p>
+          <a:p>
+            <a:r>
+              <a:rPr lang="en-US" sz="1600" dirty="0">
+                <a:solidFill>
+                  <a:srgbClr val="000000"/>
+                </a:solidFill>
+                <a:latin typeface="Times New Roman" panose="02020603050405020304" pitchFamily="18" charset="0"/>
+                <a:cs typeface="Times New Roman" panose="02020603050405020304" pitchFamily="18" charset="0"/>
+              </a:rPr>
+              <a:t>    {        </a:t>
+            </a:r>
+          </a:p>
+          <a:p>
+            <a:r>
+              <a:rPr lang="en-US" sz="1600" dirty="0">
+                <a:solidFill>
+                  <a:srgbClr val="000000"/>
+                </a:solidFill>
+                <a:latin typeface="Times New Roman" panose="02020603050405020304" pitchFamily="18" charset="0"/>
+                <a:cs typeface="Times New Roman" panose="02020603050405020304" pitchFamily="18" charset="0"/>
+              </a:rPr>
+              <a:t>    </a:t>
+            </a:r>
+            <a:r>
+              <a:rPr lang="en-US" sz="1600" dirty="0">
+                <a:solidFill>
+                  <a:srgbClr val="3F7F5F"/>
+                </a:solidFill>
+                <a:latin typeface="Times New Roman" panose="02020603050405020304" pitchFamily="18" charset="0"/>
+                <a:cs typeface="Times New Roman" panose="02020603050405020304" pitchFamily="18" charset="0"/>
+              </a:rPr>
+              <a:t>//@Override</a:t>
+            </a:r>
+          </a:p>
+          <a:p>
+            <a:r>
+              <a:rPr lang="en-US" sz="1600" dirty="0">
+                <a:solidFill>
+                  <a:srgbClr val="000000"/>
+                </a:solidFill>
+                <a:latin typeface="Times New Roman" panose="02020603050405020304" pitchFamily="18" charset="0"/>
+                <a:cs typeface="Times New Roman" panose="02020603050405020304" pitchFamily="18" charset="0"/>
+              </a:rPr>
+              <a:t>    </a:t>
+            </a:r>
+            <a:r>
+              <a:rPr lang="en-US" sz="1600" b="1" dirty="0">
+                <a:solidFill>
+                  <a:srgbClr val="7F0055"/>
+                </a:solidFill>
+                <a:latin typeface="Times New Roman" panose="02020603050405020304" pitchFamily="18" charset="0"/>
+                <a:cs typeface="Times New Roman" panose="02020603050405020304" pitchFamily="18" charset="0"/>
+              </a:rPr>
+              <a:t>public</a:t>
+            </a:r>
+            <a:r>
+              <a:rPr lang="en-US" sz="1600" b="1" dirty="0">
+                <a:solidFill>
+                  <a:srgbClr val="000000"/>
+                </a:solidFill>
+                <a:latin typeface="Times New Roman" panose="02020603050405020304" pitchFamily="18" charset="0"/>
+                <a:cs typeface="Times New Roman" panose="02020603050405020304" pitchFamily="18" charset="0"/>
+              </a:rPr>
+              <a:t> </a:t>
+            </a:r>
+            <a:r>
+              <a:rPr lang="en-US" sz="1600" b="1" dirty="0">
+                <a:solidFill>
+                  <a:srgbClr val="7F0055"/>
+                </a:solidFill>
+                <a:latin typeface="Times New Roman" panose="02020603050405020304" pitchFamily="18" charset="0"/>
+                <a:cs typeface="Times New Roman" panose="02020603050405020304" pitchFamily="18" charset="0"/>
+              </a:rPr>
+              <a:t>void</a:t>
+            </a:r>
+            <a:r>
+              <a:rPr lang="en-US" sz="1600" b="1" dirty="0">
+                <a:solidFill>
+                  <a:srgbClr val="000000"/>
+                </a:solidFill>
+                <a:latin typeface="Times New Roman" panose="02020603050405020304" pitchFamily="18" charset="0"/>
+                <a:cs typeface="Times New Roman" panose="02020603050405020304" pitchFamily="18" charset="0"/>
+              </a:rPr>
+              <a:t> update()</a:t>
+            </a:r>
+          </a:p>
+          <a:p>
+            <a:r>
+              <a:rPr lang="en-US" sz="1600" dirty="0">
+                <a:solidFill>
+                  <a:srgbClr val="000000"/>
+                </a:solidFill>
+                <a:latin typeface="Times New Roman" panose="02020603050405020304" pitchFamily="18" charset="0"/>
+                <a:cs typeface="Times New Roman" panose="02020603050405020304" pitchFamily="18" charset="0"/>
+              </a:rPr>
+              <a:t>        {</a:t>
+            </a:r>
+          </a:p>
+          <a:p>
+            <a:r>
+              <a:rPr lang="en-US" sz="1600" dirty="0">
+                <a:solidFill>
+                  <a:srgbClr val="000000"/>
+                </a:solidFill>
+                <a:latin typeface="Times New Roman" panose="02020603050405020304" pitchFamily="18" charset="0"/>
+                <a:cs typeface="Times New Roman" panose="02020603050405020304" pitchFamily="18" charset="0"/>
+              </a:rPr>
+              <a:t>        </a:t>
+            </a:r>
+            <a:r>
+              <a:rPr lang="en-US" sz="1600" dirty="0" err="1">
+                <a:solidFill>
+                  <a:srgbClr val="000000"/>
+                </a:solidFill>
+                <a:latin typeface="Times New Roman" panose="02020603050405020304" pitchFamily="18" charset="0"/>
+                <a:cs typeface="Times New Roman" panose="02020603050405020304" pitchFamily="18" charset="0"/>
+              </a:rPr>
+              <a:t>System.</a:t>
+            </a:r>
+            <a:r>
+              <a:rPr lang="en-US" sz="1600" b="1" i="1" dirty="0" err="1">
+                <a:solidFill>
+                  <a:srgbClr val="0000C0"/>
+                </a:solidFill>
+                <a:latin typeface="Times New Roman" panose="02020603050405020304" pitchFamily="18" charset="0"/>
+                <a:cs typeface="Times New Roman" panose="02020603050405020304" pitchFamily="18" charset="0"/>
+              </a:rPr>
+              <a:t>out</a:t>
+            </a:r>
+            <a:r>
+              <a:rPr lang="en-US" sz="1600" b="1" i="1" dirty="0" err="1">
+                <a:solidFill>
+                  <a:srgbClr val="000000"/>
+                </a:solidFill>
+                <a:latin typeface="Times New Roman" panose="02020603050405020304" pitchFamily="18" charset="0"/>
+                <a:cs typeface="Times New Roman" panose="02020603050405020304" pitchFamily="18" charset="0"/>
+              </a:rPr>
+              <a:t>.println</a:t>
+            </a:r>
+            <a:r>
+              <a:rPr lang="en-US" sz="1600" b="1" i="1" dirty="0">
+                <a:solidFill>
+                  <a:srgbClr val="000000"/>
+                </a:solidFill>
+                <a:latin typeface="Times New Roman" panose="02020603050405020304" pitchFamily="18" charset="0"/>
+                <a:cs typeface="Times New Roman" panose="02020603050405020304" pitchFamily="18" charset="0"/>
+              </a:rPr>
+              <a:t>(</a:t>
+            </a:r>
+            <a:r>
+              <a:rPr lang="en-US" sz="1600" b="1" i="1" dirty="0">
+                <a:solidFill>
+                  <a:srgbClr val="2A00FF"/>
+                </a:solidFill>
+                <a:latin typeface="Times New Roman" panose="02020603050405020304" pitchFamily="18" charset="0"/>
+                <a:cs typeface="Times New Roman" panose="02020603050405020304" pitchFamily="18" charset="0"/>
+              </a:rPr>
+              <a:t>"flag value changed in Subject"</a:t>
+            </a:r>
+            <a:r>
+              <a:rPr lang="en-US" sz="1600" b="1" i="1" dirty="0">
+                <a:solidFill>
+                  <a:srgbClr val="000000"/>
+                </a:solidFill>
+                <a:latin typeface="Times New Roman" panose="02020603050405020304" pitchFamily="18" charset="0"/>
+                <a:cs typeface="Times New Roman" panose="02020603050405020304" pitchFamily="18" charset="0"/>
+              </a:rPr>
+              <a:t>);</a:t>
+            </a:r>
+          </a:p>
+          <a:p>
+            <a:r>
+              <a:rPr lang="en-US" sz="1600" dirty="0">
+                <a:solidFill>
+                  <a:srgbClr val="000000"/>
+                </a:solidFill>
+                <a:latin typeface="Times New Roman" panose="02020603050405020304" pitchFamily="18" charset="0"/>
+                <a:cs typeface="Times New Roman" panose="02020603050405020304" pitchFamily="18" charset="0"/>
+              </a:rPr>
+              <a:t>        }</a:t>
+            </a:r>
+          </a:p>
+          <a:p>
+            <a:r>
+              <a:rPr lang="en-US" sz="1600" dirty="0">
+                <a:solidFill>
+                  <a:srgbClr val="000000"/>
+                </a:solidFill>
+                <a:latin typeface="Times New Roman" panose="02020603050405020304" pitchFamily="18" charset="0"/>
+                <a:cs typeface="Times New Roman" panose="02020603050405020304" pitchFamily="18" charset="0"/>
+              </a:rPr>
+              <a:t>    }</a:t>
+            </a:r>
+          </a:p>
+          <a:p>
+            <a:endParaRPr lang="en-US" sz="1600" dirty="0">
+              <a:latin typeface="Times New Roman" panose="02020603050405020304" pitchFamily="18" charset="0"/>
+              <a:cs typeface="Times New Roman" panose="02020603050405020304" pitchFamily="18" charset="0"/>
+            </a:endParaRPr>
+          </a:p>
+          <a:p>
+            <a:r>
+              <a:rPr lang="en-US" sz="1600" dirty="0">
+                <a:solidFill>
+                  <a:srgbClr val="000000"/>
+                </a:solidFill>
+                <a:latin typeface="Times New Roman" panose="02020603050405020304" pitchFamily="18" charset="0"/>
+                <a:cs typeface="Times New Roman" panose="02020603050405020304" pitchFamily="18" charset="0"/>
+              </a:rPr>
+              <a:t>    </a:t>
+            </a:r>
+            <a:r>
+              <a:rPr lang="en-US" sz="1600" b="1" dirty="0">
+                <a:solidFill>
+                  <a:srgbClr val="7F0055"/>
+                </a:solidFill>
+                <a:latin typeface="Times New Roman" panose="02020603050405020304" pitchFamily="18" charset="0"/>
+                <a:cs typeface="Times New Roman" panose="02020603050405020304" pitchFamily="18" charset="0"/>
+              </a:rPr>
+              <a:t>interface</a:t>
+            </a:r>
+            <a:r>
+              <a:rPr lang="en-US" sz="1600" b="1" dirty="0">
+                <a:solidFill>
+                  <a:srgbClr val="000000"/>
+                </a:solidFill>
+                <a:latin typeface="Times New Roman" panose="02020603050405020304" pitchFamily="18" charset="0"/>
+                <a:cs typeface="Times New Roman" panose="02020603050405020304" pitchFamily="18" charset="0"/>
+              </a:rPr>
+              <a:t> </a:t>
+            </a:r>
+            <a:r>
+              <a:rPr lang="en-US" sz="1600" b="1" dirty="0" err="1">
+                <a:solidFill>
+                  <a:srgbClr val="000000"/>
+                </a:solidFill>
+                <a:latin typeface="Times New Roman" panose="02020603050405020304" pitchFamily="18" charset="0"/>
+                <a:cs typeface="Times New Roman" panose="02020603050405020304" pitchFamily="18" charset="0"/>
+              </a:rPr>
+              <a:t>ISubject</a:t>
+            </a:r>
+            <a:endParaRPr lang="en-US" sz="1600" b="1" dirty="0">
+              <a:solidFill>
+                <a:srgbClr val="000000"/>
+              </a:solidFill>
+              <a:latin typeface="Times New Roman" panose="02020603050405020304" pitchFamily="18" charset="0"/>
+              <a:cs typeface="Times New Roman" panose="02020603050405020304" pitchFamily="18" charset="0"/>
+            </a:endParaRPr>
+          </a:p>
+          <a:p>
+            <a:r>
+              <a:rPr lang="en-US" sz="1600" dirty="0">
+                <a:solidFill>
+                  <a:srgbClr val="000000"/>
+                </a:solidFill>
+                <a:latin typeface="Times New Roman" panose="02020603050405020304" pitchFamily="18" charset="0"/>
+                <a:cs typeface="Times New Roman" panose="02020603050405020304" pitchFamily="18" charset="0"/>
+              </a:rPr>
+              <a:t>    {</a:t>
+            </a:r>
+          </a:p>
+          <a:p>
+            <a:r>
+              <a:rPr lang="en-US" sz="1600" dirty="0">
+                <a:solidFill>
+                  <a:srgbClr val="000000"/>
+                </a:solidFill>
+                <a:latin typeface="Times New Roman" panose="02020603050405020304" pitchFamily="18" charset="0"/>
+                <a:cs typeface="Times New Roman" panose="02020603050405020304" pitchFamily="18" charset="0"/>
+              </a:rPr>
+              <a:t>        </a:t>
+            </a:r>
+            <a:r>
+              <a:rPr lang="en-US" sz="1600" b="1" dirty="0">
+                <a:solidFill>
+                  <a:srgbClr val="7F0055"/>
+                </a:solidFill>
+                <a:latin typeface="Times New Roman" panose="02020603050405020304" pitchFamily="18" charset="0"/>
+                <a:cs typeface="Times New Roman" panose="02020603050405020304" pitchFamily="18" charset="0"/>
+              </a:rPr>
+              <a:t>void</a:t>
+            </a:r>
+            <a:r>
+              <a:rPr lang="en-US" sz="1600" b="1" dirty="0">
+                <a:solidFill>
+                  <a:srgbClr val="000000"/>
+                </a:solidFill>
+                <a:latin typeface="Times New Roman" panose="02020603050405020304" pitchFamily="18" charset="0"/>
+                <a:cs typeface="Times New Roman" panose="02020603050405020304" pitchFamily="18" charset="0"/>
+              </a:rPr>
+              <a:t> register(Observer </a:t>
+            </a:r>
+            <a:r>
+              <a:rPr lang="en-US" sz="1600" b="1" dirty="0">
+                <a:solidFill>
+                  <a:srgbClr val="6A3E3E"/>
+                </a:solidFill>
+                <a:latin typeface="Times New Roman" panose="02020603050405020304" pitchFamily="18" charset="0"/>
+                <a:cs typeface="Times New Roman" panose="02020603050405020304" pitchFamily="18" charset="0"/>
+              </a:rPr>
+              <a:t>o</a:t>
+            </a:r>
+            <a:r>
+              <a:rPr lang="en-US" sz="1600" b="1" dirty="0">
+                <a:solidFill>
+                  <a:srgbClr val="000000"/>
+                </a:solidFill>
+                <a:latin typeface="Times New Roman" panose="02020603050405020304" pitchFamily="18" charset="0"/>
+                <a:cs typeface="Times New Roman" panose="02020603050405020304" pitchFamily="18" charset="0"/>
+              </a:rPr>
+              <a:t>);</a:t>
+            </a:r>
+          </a:p>
+          <a:p>
+            <a:r>
+              <a:rPr lang="en-US" sz="1600" dirty="0">
+                <a:solidFill>
+                  <a:srgbClr val="000000"/>
+                </a:solidFill>
+                <a:latin typeface="Times New Roman" panose="02020603050405020304" pitchFamily="18" charset="0"/>
+                <a:cs typeface="Times New Roman" panose="02020603050405020304" pitchFamily="18" charset="0"/>
+              </a:rPr>
+              <a:t>        </a:t>
+            </a:r>
+            <a:r>
+              <a:rPr lang="en-US" sz="1600" b="1" dirty="0">
+                <a:solidFill>
+                  <a:srgbClr val="7F0055"/>
+                </a:solidFill>
+                <a:latin typeface="Times New Roman" panose="02020603050405020304" pitchFamily="18" charset="0"/>
+                <a:cs typeface="Times New Roman" panose="02020603050405020304" pitchFamily="18" charset="0"/>
+              </a:rPr>
+              <a:t>void</a:t>
+            </a:r>
+            <a:r>
+              <a:rPr lang="en-US" sz="1600" b="1" dirty="0">
+                <a:solidFill>
+                  <a:srgbClr val="000000"/>
+                </a:solidFill>
+                <a:latin typeface="Times New Roman" panose="02020603050405020304" pitchFamily="18" charset="0"/>
+                <a:cs typeface="Times New Roman" panose="02020603050405020304" pitchFamily="18" charset="0"/>
+              </a:rPr>
+              <a:t> unregister( Observer </a:t>
+            </a:r>
+            <a:r>
+              <a:rPr lang="en-US" sz="1600" b="1" dirty="0">
+                <a:solidFill>
+                  <a:srgbClr val="6A3E3E"/>
+                </a:solidFill>
+                <a:latin typeface="Times New Roman" panose="02020603050405020304" pitchFamily="18" charset="0"/>
+                <a:cs typeface="Times New Roman" panose="02020603050405020304" pitchFamily="18" charset="0"/>
+              </a:rPr>
+              <a:t>o</a:t>
+            </a:r>
+            <a:r>
+              <a:rPr lang="en-US" sz="1600" b="1" dirty="0">
+                <a:solidFill>
+                  <a:srgbClr val="000000"/>
+                </a:solidFill>
+                <a:latin typeface="Times New Roman" panose="02020603050405020304" pitchFamily="18" charset="0"/>
+                <a:cs typeface="Times New Roman" panose="02020603050405020304" pitchFamily="18" charset="0"/>
+              </a:rPr>
+              <a:t>);</a:t>
+            </a:r>
+          </a:p>
+          <a:p>
+            <a:r>
+              <a:rPr lang="en-US" sz="1600" dirty="0">
+                <a:solidFill>
+                  <a:srgbClr val="000000"/>
+                </a:solidFill>
+                <a:latin typeface="Times New Roman" panose="02020603050405020304" pitchFamily="18" charset="0"/>
+                <a:cs typeface="Times New Roman" panose="02020603050405020304" pitchFamily="18" charset="0"/>
+              </a:rPr>
+              <a:t>        </a:t>
+            </a:r>
+            <a:r>
+              <a:rPr lang="en-US" sz="1600" b="1" dirty="0">
+                <a:solidFill>
+                  <a:srgbClr val="7F0055"/>
+                </a:solidFill>
+                <a:latin typeface="Times New Roman" panose="02020603050405020304" pitchFamily="18" charset="0"/>
+                <a:cs typeface="Times New Roman" panose="02020603050405020304" pitchFamily="18" charset="0"/>
+              </a:rPr>
+              <a:t>void</a:t>
+            </a:r>
+            <a:r>
+              <a:rPr lang="en-US" sz="1600" b="1" dirty="0">
+                <a:solidFill>
+                  <a:srgbClr val="000000"/>
+                </a:solidFill>
+                <a:latin typeface="Times New Roman" panose="02020603050405020304" pitchFamily="18" charset="0"/>
+                <a:cs typeface="Times New Roman" panose="02020603050405020304" pitchFamily="18" charset="0"/>
+              </a:rPr>
+              <a:t> </a:t>
+            </a:r>
+            <a:r>
+              <a:rPr lang="en-US" sz="1600" b="1" dirty="0" err="1">
+                <a:solidFill>
+                  <a:srgbClr val="000000"/>
+                </a:solidFill>
+                <a:latin typeface="Times New Roman" panose="02020603050405020304" pitchFamily="18" charset="0"/>
+                <a:cs typeface="Times New Roman" panose="02020603050405020304" pitchFamily="18" charset="0"/>
+              </a:rPr>
+              <a:t>notifyObservers</a:t>
+            </a:r>
+            <a:r>
+              <a:rPr lang="en-US" sz="1600" b="1" dirty="0">
+                <a:solidFill>
+                  <a:srgbClr val="000000"/>
+                </a:solidFill>
+                <a:latin typeface="Times New Roman" panose="02020603050405020304" pitchFamily="18" charset="0"/>
+                <a:cs typeface="Times New Roman" panose="02020603050405020304" pitchFamily="18" charset="0"/>
+              </a:rPr>
+              <a:t>();</a:t>
+            </a:r>
+          </a:p>
+          <a:p>
+            <a:r>
+              <a:rPr lang="en-US" sz="1600" dirty="0">
+                <a:solidFill>
+                  <a:srgbClr val="000000"/>
+                </a:solidFill>
+                <a:latin typeface="Times New Roman" panose="02020603050405020304" pitchFamily="18" charset="0"/>
+                <a:cs typeface="Times New Roman" panose="02020603050405020304" pitchFamily="18" charset="0"/>
+              </a:rPr>
+              <a:t>    }</a:t>
+            </a:r>
+            <a:endParaRPr lang="en-US" sz="1600" dirty="0">
               <a:latin typeface="Times New Roman" panose="02020603050405020304" pitchFamily="18" charset="0"/>
               <a:cs typeface="Times New Roman" panose="02020603050405020304" pitchFamily="18" charset="0"/>
             </a:endParaRPr>
@@ -21454,60 +21887,6 @@
           </a:p>
         </p:txBody>
       </p:sp>
-      <p:pic>
-        <p:nvPicPr>
-          <p:cNvPr id="2050" name="Picture 2" descr="Untitled"/>
-          <p:cNvPicPr>
-            <a:picLocks noChangeAspect="1" noChangeArrowheads="1"/>
-          </p:cNvPicPr>
-          <p:nvPr/>
-        </p:nvPicPr>
-        <p:blipFill>
-          <a:blip r:embed="rId3">
-            <a:extLst>
-              <a:ext uri="{28A0092B-C50C-407E-A947-70E740481C1C}">
-                <a14:useLocalDpi xmlns:a14="http://schemas.microsoft.com/office/drawing/2010/main" val="0"/>
-              </a:ext>
-            </a:extLst>
-          </a:blip>
-          <a:srcRect/>
-          <a:stretch>
-            <a:fillRect/>
-          </a:stretch>
-        </p:blipFill>
-        <p:spPr bwMode="auto">
-          <a:xfrm>
-            <a:off x="757644" y="2761800"/>
-            <a:ext cx="8984254" cy="3981450"/>
-          </a:xfrm>
-          <a:prstGeom prst="rect">
-            <a:avLst/>
-          </a:prstGeom>
-          <a:noFill/>
-          <a:ln>
-            <a:noFill/>
-          </a:ln>
-          <a:extLst>
-            <a:ext uri="{909E8E84-426E-40DD-AFC4-6F175D3DCCD1}">
-              <a14:hiddenFill xmlns:a14="http://schemas.microsoft.com/office/drawing/2010/main">
-                <a:solidFill>
-                  <a:srgbClr val="FFFFFF"/>
-                </a:solidFill>
-              </a14:hiddenFill>
-            </a:ext>
-            <a:ext uri="{91240B29-F687-4F45-9708-019B960494DF}">
-              <a14:hiddenLine xmlns:a14="http://schemas.microsoft.com/office/drawing/2010/main" w="9525">
-                <a:solidFill>
-                  <a:srgbClr val="000000"/>
-                </a:solidFill>
-                <a:miter lim="800000"/>
-                <a:headEnd/>
-                <a:tailEnd/>
-              </a14:hiddenLine>
-            </a:ext>
-          </a:extLst>
-        </p:spPr>
-      </p:pic>
       <p:sp>
         <p:nvSpPr>
           <p:cNvPr id="7" name="Rectangle 6"/>
@@ -21565,6 +21944,1505 @@
               <a:t>:</a:t>
             </a:r>
             <a:endParaRPr lang="en-GB" sz="3200" dirty="0">
+              <a:latin typeface="Times New Roman" panose="02020603050405020304" pitchFamily="18" charset="0"/>
+              <a:cs typeface="Times New Roman" panose="02020603050405020304" pitchFamily="18" charset="0"/>
+            </a:endParaRPr>
+          </a:p>
+        </p:txBody>
+      </p:sp>
+      <p:sp>
+        <p:nvSpPr>
+          <p:cNvPr id="2" name="Rectangle 1"/>
+          <p:cNvSpPr/>
+          <p:nvPr/>
+        </p:nvSpPr>
+        <p:spPr>
+          <a:xfrm>
+            <a:off x="757644" y="2603989"/>
+            <a:ext cx="6096000" cy="3539430"/>
+          </a:xfrm>
+          <a:prstGeom prst="rect">
+            <a:avLst/>
+          </a:prstGeom>
+        </p:spPr>
+        <p:txBody>
+          <a:bodyPr>
+            <a:spAutoFit/>
+          </a:bodyPr>
+          <a:lstStyle/>
+          <a:p>
+            <a:r>
+              <a:rPr lang="en-US" sz="1400" dirty="0">
+                <a:solidFill>
+                  <a:srgbClr val="000000"/>
+                </a:solidFill>
+                <a:latin typeface="Times New Roman" panose="02020603050405020304" pitchFamily="18" charset="0"/>
+                <a:cs typeface="Times New Roman" panose="02020603050405020304" pitchFamily="18" charset="0"/>
+              </a:rPr>
+              <a:t> </a:t>
+            </a:r>
+            <a:r>
+              <a:rPr lang="en-US" sz="1400" b="1" dirty="0">
+                <a:solidFill>
+                  <a:srgbClr val="7F0055"/>
+                </a:solidFill>
+                <a:latin typeface="Times New Roman" panose="02020603050405020304" pitchFamily="18" charset="0"/>
+                <a:cs typeface="Times New Roman" panose="02020603050405020304" pitchFamily="18" charset="0"/>
+              </a:rPr>
+              <a:t>class</a:t>
+            </a:r>
+            <a:r>
+              <a:rPr lang="en-US" sz="1400" b="1" dirty="0">
+                <a:solidFill>
+                  <a:srgbClr val="000000"/>
+                </a:solidFill>
+                <a:latin typeface="Times New Roman" panose="02020603050405020304" pitchFamily="18" charset="0"/>
+                <a:cs typeface="Times New Roman" panose="02020603050405020304" pitchFamily="18" charset="0"/>
+              </a:rPr>
+              <a:t> Subject </a:t>
+            </a:r>
+            <a:r>
+              <a:rPr lang="en-US" sz="1400" b="1" dirty="0">
+                <a:solidFill>
+                  <a:srgbClr val="7F0055"/>
+                </a:solidFill>
+                <a:latin typeface="Times New Roman" panose="02020603050405020304" pitchFamily="18" charset="0"/>
+                <a:cs typeface="Times New Roman" panose="02020603050405020304" pitchFamily="18" charset="0"/>
+              </a:rPr>
+              <a:t>implements</a:t>
+            </a:r>
+            <a:r>
+              <a:rPr lang="en-US" sz="1400" b="1" dirty="0">
+                <a:solidFill>
+                  <a:srgbClr val="000000"/>
+                </a:solidFill>
+                <a:latin typeface="Times New Roman" panose="02020603050405020304" pitchFamily="18" charset="0"/>
+                <a:cs typeface="Times New Roman" panose="02020603050405020304" pitchFamily="18" charset="0"/>
+              </a:rPr>
+              <a:t> </a:t>
+            </a:r>
+            <a:r>
+              <a:rPr lang="en-US" sz="1400" b="1" dirty="0" err="1">
+                <a:solidFill>
+                  <a:srgbClr val="000000"/>
+                </a:solidFill>
+                <a:latin typeface="Times New Roman" panose="02020603050405020304" pitchFamily="18" charset="0"/>
+                <a:cs typeface="Times New Roman" panose="02020603050405020304" pitchFamily="18" charset="0"/>
+              </a:rPr>
+              <a:t>ISubject</a:t>
+            </a:r>
+            <a:endParaRPr lang="en-US" sz="1400" b="1" dirty="0">
+              <a:solidFill>
+                <a:srgbClr val="000000"/>
+              </a:solidFill>
+              <a:latin typeface="Times New Roman" panose="02020603050405020304" pitchFamily="18" charset="0"/>
+              <a:cs typeface="Times New Roman" panose="02020603050405020304" pitchFamily="18" charset="0"/>
+            </a:endParaRPr>
+          </a:p>
+          <a:p>
+            <a:r>
+              <a:rPr lang="en-US" sz="1400" dirty="0">
+                <a:solidFill>
+                  <a:srgbClr val="000000"/>
+                </a:solidFill>
+                <a:latin typeface="Times New Roman" panose="02020603050405020304" pitchFamily="18" charset="0"/>
+                <a:cs typeface="Times New Roman" panose="02020603050405020304" pitchFamily="18" charset="0"/>
+              </a:rPr>
+              <a:t>    {</a:t>
+            </a:r>
+          </a:p>
+          <a:p>
+            <a:r>
+              <a:rPr lang="en-US" sz="1400" dirty="0">
+                <a:solidFill>
+                  <a:srgbClr val="000000"/>
+                </a:solidFill>
+                <a:latin typeface="Times New Roman" panose="02020603050405020304" pitchFamily="18" charset="0"/>
+                <a:cs typeface="Times New Roman" panose="02020603050405020304" pitchFamily="18" charset="0"/>
+              </a:rPr>
+              <a:t>        </a:t>
+            </a:r>
+            <a:r>
+              <a:rPr lang="en-US" sz="1400" dirty="0">
+                <a:solidFill>
+                  <a:srgbClr val="3F7F5F"/>
+                </a:solidFill>
+                <a:latin typeface="Times New Roman" panose="02020603050405020304" pitchFamily="18" charset="0"/>
+                <a:cs typeface="Times New Roman" panose="02020603050405020304" pitchFamily="18" charset="0"/>
+              </a:rPr>
+              <a:t>//List&lt;</a:t>
+            </a:r>
+            <a:r>
+              <a:rPr lang="en-US" sz="1400" dirty="0" err="1">
+                <a:solidFill>
+                  <a:srgbClr val="3F7F5F"/>
+                </a:solidFill>
+                <a:latin typeface="Times New Roman" panose="02020603050405020304" pitchFamily="18" charset="0"/>
+                <a:cs typeface="Times New Roman" panose="02020603050405020304" pitchFamily="18" charset="0"/>
+              </a:rPr>
+              <a:t>IObserver</a:t>
+            </a:r>
+            <a:r>
+              <a:rPr lang="en-US" sz="1400" dirty="0">
+                <a:solidFill>
+                  <a:srgbClr val="3F7F5F"/>
+                </a:solidFill>
+                <a:latin typeface="Times New Roman" panose="02020603050405020304" pitchFamily="18" charset="0"/>
+                <a:cs typeface="Times New Roman" panose="02020603050405020304" pitchFamily="18" charset="0"/>
+              </a:rPr>
+              <a:t>&gt; </a:t>
+            </a:r>
+            <a:r>
+              <a:rPr lang="en-US" sz="1400" dirty="0" err="1">
+                <a:solidFill>
+                  <a:srgbClr val="3F7F5F"/>
+                </a:solidFill>
+                <a:latin typeface="Times New Roman" panose="02020603050405020304" pitchFamily="18" charset="0"/>
+                <a:cs typeface="Times New Roman" panose="02020603050405020304" pitchFamily="18" charset="0"/>
+              </a:rPr>
+              <a:t>observerList</a:t>
+            </a:r>
+            <a:r>
+              <a:rPr lang="en-US" sz="1400" dirty="0">
+                <a:solidFill>
+                  <a:srgbClr val="3F7F5F"/>
+                </a:solidFill>
+                <a:latin typeface="Times New Roman" panose="02020603050405020304" pitchFamily="18" charset="0"/>
+                <a:cs typeface="Times New Roman" panose="02020603050405020304" pitchFamily="18" charset="0"/>
+              </a:rPr>
+              <a:t> = new </a:t>
+            </a:r>
+            <a:r>
+              <a:rPr lang="en-US" sz="1400" dirty="0" err="1">
+                <a:solidFill>
+                  <a:srgbClr val="3F7F5F"/>
+                </a:solidFill>
+                <a:latin typeface="Times New Roman" panose="02020603050405020304" pitchFamily="18" charset="0"/>
+                <a:cs typeface="Times New Roman" panose="02020603050405020304" pitchFamily="18" charset="0"/>
+              </a:rPr>
+              <a:t>ArrayList</a:t>
+            </a:r>
+            <a:r>
+              <a:rPr lang="en-US" sz="1400" dirty="0">
+                <a:solidFill>
+                  <a:srgbClr val="3F7F5F"/>
+                </a:solidFill>
+                <a:latin typeface="Times New Roman" panose="02020603050405020304" pitchFamily="18" charset="0"/>
+                <a:cs typeface="Times New Roman" panose="02020603050405020304" pitchFamily="18" charset="0"/>
+              </a:rPr>
+              <a:t>&lt;</a:t>
+            </a:r>
+            <a:r>
+              <a:rPr lang="en-US" sz="1400" dirty="0" err="1">
+                <a:solidFill>
+                  <a:srgbClr val="3F7F5F"/>
+                </a:solidFill>
+                <a:latin typeface="Times New Roman" panose="02020603050405020304" pitchFamily="18" charset="0"/>
+                <a:cs typeface="Times New Roman" panose="02020603050405020304" pitchFamily="18" charset="0"/>
+              </a:rPr>
+              <a:t>IObserver</a:t>
+            </a:r>
+            <a:r>
+              <a:rPr lang="en-US" sz="1400" dirty="0">
+                <a:solidFill>
+                  <a:srgbClr val="3F7F5F"/>
+                </a:solidFill>
+                <a:latin typeface="Times New Roman" panose="02020603050405020304" pitchFamily="18" charset="0"/>
+                <a:cs typeface="Times New Roman" panose="02020603050405020304" pitchFamily="18" charset="0"/>
+              </a:rPr>
+              <a:t>&gt;();</a:t>
+            </a:r>
+          </a:p>
+          <a:p>
+            <a:r>
+              <a:rPr lang="en-US" sz="1400" dirty="0">
+                <a:solidFill>
+                  <a:srgbClr val="000000"/>
+                </a:solidFill>
+                <a:latin typeface="Times New Roman" panose="02020603050405020304" pitchFamily="18" charset="0"/>
+                <a:cs typeface="Times New Roman" panose="02020603050405020304" pitchFamily="18" charset="0"/>
+              </a:rPr>
+              <a:t>    List&lt;Observer&gt; </a:t>
+            </a:r>
+            <a:r>
+              <a:rPr lang="en-US" sz="1400" dirty="0" err="1">
+                <a:solidFill>
+                  <a:srgbClr val="0000C0"/>
+                </a:solidFill>
+                <a:latin typeface="Times New Roman" panose="02020603050405020304" pitchFamily="18" charset="0"/>
+                <a:cs typeface="Times New Roman" panose="02020603050405020304" pitchFamily="18" charset="0"/>
+              </a:rPr>
+              <a:t>observerList</a:t>
+            </a:r>
+            <a:r>
+              <a:rPr lang="en-US" sz="1400" dirty="0">
+                <a:solidFill>
+                  <a:srgbClr val="000000"/>
+                </a:solidFill>
+                <a:latin typeface="Times New Roman" panose="02020603050405020304" pitchFamily="18" charset="0"/>
+                <a:cs typeface="Times New Roman" panose="02020603050405020304" pitchFamily="18" charset="0"/>
+              </a:rPr>
+              <a:t> = </a:t>
+            </a:r>
+            <a:r>
+              <a:rPr lang="en-US" sz="1400" b="1" dirty="0">
+                <a:solidFill>
+                  <a:srgbClr val="7F0055"/>
+                </a:solidFill>
+                <a:latin typeface="Times New Roman" panose="02020603050405020304" pitchFamily="18" charset="0"/>
+                <a:cs typeface="Times New Roman" panose="02020603050405020304" pitchFamily="18" charset="0"/>
+              </a:rPr>
+              <a:t>new</a:t>
+            </a:r>
+            <a:r>
+              <a:rPr lang="en-US" sz="1400" b="1" dirty="0">
+                <a:solidFill>
+                  <a:srgbClr val="000000"/>
+                </a:solidFill>
+                <a:latin typeface="Times New Roman" panose="02020603050405020304" pitchFamily="18" charset="0"/>
+                <a:cs typeface="Times New Roman" panose="02020603050405020304" pitchFamily="18" charset="0"/>
+              </a:rPr>
+              <a:t> </a:t>
+            </a:r>
+            <a:r>
+              <a:rPr lang="en-US" sz="1400" b="1" dirty="0" err="1">
+                <a:solidFill>
+                  <a:srgbClr val="000000"/>
+                </a:solidFill>
+                <a:latin typeface="Times New Roman" panose="02020603050405020304" pitchFamily="18" charset="0"/>
+                <a:cs typeface="Times New Roman" panose="02020603050405020304" pitchFamily="18" charset="0"/>
+              </a:rPr>
+              <a:t>ArrayList</a:t>
+            </a:r>
+            <a:r>
+              <a:rPr lang="en-US" sz="1400" b="1" dirty="0">
+                <a:solidFill>
+                  <a:srgbClr val="000000"/>
+                </a:solidFill>
+                <a:latin typeface="Times New Roman" panose="02020603050405020304" pitchFamily="18" charset="0"/>
+                <a:cs typeface="Times New Roman" panose="02020603050405020304" pitchFamily="18" charset="0"/>
+              </a:rPr>
+              <a:t>&lt;Observer&gt;();</a:t>
+            </a:r>
+          </a:p>
+          <a:p>
+            <a:r>
+              <a:rPr lang="en-US" sz="1400" dirty="0">
+                <a:solidFill>
+                  <a:srgbClr val="000000"/>
+                </a:solidFill>
+                <a:latin typeface="Times New Roman" panose="02020603050405020304" pitchFamily="18" charset="0"/>
+                <a:cs typeface="Times New Roman" panose="02020603050405020304" pitchFamily="18" charset="0"/>
+              </a:rPr>
+              <a:t>        </a:t>
+            </a:r>
+            <a:r>
+              <a:rPr lang="en-US" sz="1400" b="1" dirty="0">
+                <a:solidFill>
+                  <a:srgbClr val="7F0055"/>
+                </a:solidFill>
+                <a:latin typeface="Times New Roman" panose="02020603050405020304" pitchFamily="18" charset="0"/>
+                <a:cs typeface="Times New Roman" panose="02020603050405020304" pitchFamily="18" charset="0"/>
+              </a:rPr>
+              <a:t>private</a:t>
+            </a:r>
+            <a:r>
+              <a:rPr lang="en-US" sz="1400" b="1" dirty="0">
+                <a:solidFill>
+                  <a:srgbClr val="000000"/>
+                </a:solidFill>
+                <a:latin typeface="Times New Roman" panose="02020603050405020304" pitchFamily="18" charset="0"/>
+                <a:cs typeface="Times New Roman" panose="02020603050405020304" pitchFamily="18" charset="0"/>
+              </a:rPr>
+              <a:t> </a:t>
+            </a:r>
+            <a:r>
+              <a:rPr lang="en-US" sz="1400" b="1" dirty="0" err="1">
+                <a:solidFill>
+                  <a:srgbClr val="7F0055"/>
+                </a:solidFill>
+                <a:latin typeface="Times New Roman" panose="02020603050405020304" pitchFamily="18" charset="0"/>
+                <a:cs typeface="Times New Roman" panose="02020603050405020304" pitchFamily="18" charset="0"/>
+              </a:rPr>
+              <a:t>int</a:t>
+            </a:r>
+            <a:r>
+              <a:rPr lang="en-US" sz="1400" b="1" dirty="0">
+                <a:solidFill>
+                  <a:srgbClr val="000000"/>
+                </a:solidFill>
+                <a:latin typeface="Times New Roman" panose="02020603050405020304" pitchFamily="18" charset="0"/>
+                <a:cs typeface="Times New Roman" panose="02020603050405020304" pitchFamily="18" charset="0"/>
+              </a:rPr>
+              <a:t> </a:t>
+            </a:r>
+            <a:r>
+              <a:rPr lang="en-US" sz="1400" b="1" dirty="0">
+                <a:solidFill>
+                  <a:srgbClr val="0000C0"/>
+                </a:solidFill>
+                <a:latin typeface="Times New Roman" panose="02020603050405020304" pitchFamily="18" charset="0"/>
+                <a:cs typeface="Times New Roman" panose="02020603050405020304" pitchFamily="18" charset="0"/>
+              </a:rPr>
+              <a:t>_flag</a:t>
+            </a:r>
+            <a:r>
+              <a:rPr lang="en-US" sz="1400" b="1" dirty="0">
+                <a:solidFill>
+                  <a:srgbClr val="000000"/>
+                </a:solidFill>
+                <a:latin typeface="Times New Roman" panose="02020603050405020304" pitchFamily="18" charset="0"/>
+                <a:cs typeface="Times New Roman" panose="02020603050405020304" pitchFamily="18" charset="0"/>
+              </a:rPr>
+              <a:t>;</a:t>
+            </a:r>
+          </a:p>
+          <a:p>
+            <a:r>
+              <a:rPr lang="en-US" sz="1400" b="1" dirty="0">
+                <a:solidFill>
+                  <a:srgbClr val="7F0055"/>
+                </a:solidFill>
+                <a:latin typeface="Times New Roman" panose="02020603050405020304" pitchFamily="18" charset="0"/>
+                <a:cs typeface="Times New Roman" panose="02020603050405020304" pitchFamily="18" charset="0"/>
+              </a:rPr>
+              <a:t>public</a:t>
+            </a:r>
+            <a:r>
+              <a:rPr lang="en-US" sz="1400" b="1" dirty="0">
+                <a:solidFill>
+                  <a:srgbClr val="000000"/>
+                </a:solidFill>
+                <a:latin typeface="Times New Roman" panose="02020603050405020304" pitchFamily="18" charset="0"/>
+                <a:cs typeface="Times New Roman" panose="02020603050405020304" pitchFamily="18" charset="0"/>
+              </a:rPr>
+              <a:t> </a:t>
+            </a:r>
+            <a:r>
+              <a:rPr lang="en-US" sz="1400" b="1" dirty="0" err="1">
+                <a:solidFill>
+                  <a:srgbClr val="7F0055"/>
+                </a:solidFill>
+                <a:latin typeface="Times New Roman" panose="02020603050405020304" pitchFamily="18" charset="0"/>
+                <a:cs typeface="Times New Roman" panose="02020603050405020304" pitchFamily="18" charset="0"/>
+              </a:rPr>
+              <a:t>int</a:t>
+            </a:r>
+            <a:r>
+              <a:rPr lang="en-US" sz="1400" b="1" dirty="0">
+                <a:solidFill>
+                  <a:srgbClr val="000000"/>
+                </a:solidFill>
+                <a:latin typeface="Times New Roman" panose="02020603050405020304" pitchFamily="18" charset="0"/>
+                <a:cs typeface="Times New Roman" panose="02020603050405020304" pitchFamily="18" charset="0"/>
+              </a:rPr>
+              <a:t> </a:t>
+            </a:r>
+            <a:r>
+              <a:rPr lang="en-US" sz="1400" b="1" dirty="0" err="1">
+                <a:solidFill>
+                  <a:srgbClr val="000000"/>
+                </a:solidFill>
+                <a:latin typeface="Times New Roman" panose="02020603050405020304" pitchFamily="18" charset="0"/>
+                <a:cs typeface="Times New Roman" panose="02020603050405020304" pitchFamily="18" charset="0"/>
+              </a:rPr>
+              <a:t>getFlag</a:t>
+            </a:r>
+            <a:r>
+              <a:rPr lang="en-US" sz="1400" b="1" dirty="0">
+                <a:solidFill>
+                  <a:srgbClr val="000000"/>
+                </a:solidFill>
+                <a:latin typeface="Times New Roman" panose="02020603050405020304" pitchFamily="18" charset="0"/>
+                <a:cs typeface="Times New Roman" panose="02020603050405020304" pitchFamily="18" charset="0"/>
+              </a:rPr>
+              <a:t>()</a:t>
+            </a:r>
+          </a:p>
+          <a:p>
+            <a:r>
+              <a:rPr lang="en-US" sz="1400" dirty="0">
+                <a:solidFill>
+                  <a:srgbClr val="000000"/>
+                </a:solidFill>
+                <a:latin typeface="Times New Roman" panose="02020603050405020304" pitchFamily="18" charset="0"/>
+                <a:cs typeface="Times New Roman" panose="02020603050405020304" pitchFamily="18" charset="0"/>
+              </a:rPr>
+              <a:t>        {</a:t>
+            </a:r>
+          </a:p>
+          <a:p>
+            <a:r>
+              <a:rPr lang="en-US" sz="1400" dirty="0">
+                <a:solidFill>
+                  <a:srgbClr val="000000"/>
+                </a:solidFill>
+                <a:latin typeface="Times New Roman" panose="02020603050405020304" pitchFamily="18" charset="0"/>
+                <a:cs typeface="Times New Roman" panose="02020603050405020304" pitchFamily="18" charset="0"/>
+              </a:rPr>
+              <a:t>           </a:t>
+            </a:r>
+            <a:r>
+              <a:rPr lang="en-US" sz="1400" b="1" dirty="0">
+                <a:solidFill>
+                  <a:srgbClr val="7F0055"/>
+                </a:solidFill>
+                <a:latin typeface="Times New Roman" panose="02020603050405020304" pitchFamily="18" charset="0"/>
+                <a:cs typeface="Times New Roman" panose="02020603050405020304" pitchFamily="18" charset="0"/>
+              </a:rPr>
+              <a:t>return</a:t>
+            </a:r>
+            <a:r>
+              <a:rPr lang="en-US" sz="1400" b="1" dirty="0">
+                <a:solidFill>
+                  <a:srgbClr val="000000"/>
+                </a:solidFill>
+                <a:latin typeface="Times New Roman" panose="02020603050405020304" pitchFamily="18" charset="0"/>
+                <a:cs typeface="Times New Roman" panose="02020603050405020304" pitchFamily="18" charset="0"/>
+              </a:rPr>
+              <a:t> </a:t>
+            </a:r>
+            <a:r>
+              <a:rPr lang="en-US" sz="1400" b="1" dirty="0">
+                <a:solidFill>
+                  <a:srgbClr val="0000C0"/>
+                </a:solidFill>
+                <a:latin typeface="Times New Roman" panose="02020603050405020304" pitchFamily="18" charset="0"/>
+                <a:cs typeface="Times New Roman" panose="02020603050405020304" pitchFamily="18" charset="0"/>
+              </a:rPr>
+              <a:t>_flag</a:t>
+            </a:r>
+            <a:r>
+              <a:rPr lang="en-US" sz="1400" b="1" dirty="0">
+                <a:solidFill>
+                  <a:srgbClr val="000000"/>
+                </a:solidFill>
+                <a:latin typeface="Times New Roman" panose="02020603050405020304" pitchFamily="18" charset="0"/>
+                <a:cs typeface="Times New Roman" panose="02020603050405020304" pitchFamily="18" charset="0"/>
+              </a:rPr>
+              <a:t>;</a:t>
+            </a:r>
+          </a:p>
+          <a:p>
+            <a:r>
+              <a:rPr lang="en-US" sz="1400" dirty="0">
+                <a:solidFill>
+                  <a:srgbClr val="000000"/>
+                </a:solidFill>
+                <a:latin typeface="Times New Roman" panose="02020603050405020304" pitchFamily="18" charset="0"/>
+                <a:cs typeface="Times New Roman" panose="02020603050405020304" pitchFamily="18" charset="0"/>
+              </a:rPr>
+              <a:t>        }</a:t>
+            </a:r>
+          </a:p>
+          <a:p>
+            <a:r>
+              <a:rPr lang="en-US" sz="1400" dirty="0">
+                <a:solidFill>
+                  <a:srgbClr val="000000"/>
+                </a:solidFill>
+                <a:latin typeface="Times New Roman" panose="02020603050405020304" pitchFamily="18" charset="0"/>
+                <a:cs typeface="Times New Roman" panose="02020603050405020304" pitchFamily="18" charset="0"/>
+              </a:rPr>
+              <a:t>        </a:t>
+            </a:r>
+            <a:r>
+              <a:rPr lang="en-US" sz="1400" b="1" dirty="0">
+                <a:solidFill>
+                  <a:srgbClr val="7F0055"/>
+                </a:solidFill>
+                <a:latin typeface="Times New Roman" panose="02020603050405020304" pitchFamily="18" charset="0"/>
+                <a:cs typeface="Times New Roman" panose="02020603050405020304" pitchFamily="18" charset="0"/>
+              </a:rPr>
+              <a:t>public</a:t>
+            </a:r>
+            <a:r>
+              <a:rPr lang="en-US" sz="1400" b="1" dirty="0">
+                <a:solidFill>
+                  <a:srgbClr val="000000"/>
+                </a:solidFill>
+                <a:latin typeface="Times New Roman" panose="02020603050405020304" pitchFamily="18" charset="0"/>
+                <a:cs typeface="Times New Roman" panose="02020603050405020304" pitchFamily="18" charset="0"/>
+              </a:rPr>
+              <a:t> </a:t>
+            </a:r>
+            <a:r>
+              <a:rPr lang="en-US" sz="1400" b="1" dirty="0">
+                <a:solidFill>
+                  <a:srgbClr val="7F0055"/>
+                </a:solidFill>
+                <a:latin typeface="Times New Roman" panose="02020603050405020304" pitchFamily="18" charset="0"/>
+                <a:cs typeface="Times New Roman" panose="02020603050405020304" pitchFamily="18" charset="0"/>
+              </a:rPr>
+              <a:t>void</a:t>
+            </a:r>
+            <a:r>
+              <a:rPr lang="en-US" sz="1400" b="1" dirty="0">
+                <a:solidFill>
+                  <a:srgbClr val="000000"/>
+                </a:solidFill>
+                <a:latin typeface="Times New Roman" panose="02020603050405020304" pitchFamily="18" charset="0"/>
+                <a:cs typeface="Times New Roman" panose="02020603050405020304" pitchFamily="18" charset="0"/>
+              </a:rPr>
+              <a:t> </a:t>
+            </a:r>
+            <a:r>
+              <a:rPr lang="en-US" sz="1400" b="1" dirty="0" err="1">
+                <a:solidFill>
+                  <a:srgbClr val="000000"/>
+                </a:solidFill>
+                <a:latin typeface="Times New Roman" panose="02020603050405020304" pitchFamily="18" charset="0"/>
+                <a:cs typeface="Times New Roman" panose="02020603050405020304" pitchFamily="18" charset="0"/>
+              </a:rPr>
+              <a:t>setFlag</a:t>
+            </a:r>
+            <a:r>
+              <a:rPr lang="en-US" sz="1400" b="1" dirty="0">
+                <a:solidFill>
+                  <a:srgbClr val="000000"/>
+                </a:solidFill>
+                <a:latin typeface="Times New Roman" panose="02020603050405020304" pitchFamily="18" charset="0"/>
+                <a:cs typeface="Times New Roman" panose="02020603050405020304" pitchFamily="18" charset="0"/>
+              </a:rPr>
+              <a:t>(</a:t>
+            </a:r>
+            <a:r>
+              <a:rPr lang="en-US" sz="1400" b="1" dirty="0" err="1">
+                <a:solidFill>
+                  <a:srgbClr val="7F0055"/>
+                </a:solidFill>
+                <a:latin typeface="Times New Roman" panose="02020603050405020304" pitchFamily="18" charset="0"/>
+                <a:cs typeface="Times New Roman" panose="02020603050405020304" pitchFamily="18" charset="0"/>
+              </a:rPr>
+              <a:t>int</a:t>
+            </a:r>
+            <a:r>
+              <a:rPr lang="en-US" sz="1400" b="1" dirty="0">
+                <a:solidFill>
+                  <a:srgbClr val="000000"/>
+                </a:solidFill>
+                <a:latin typeface="Times New Roman" panose="02020603050405020304" pitchFamily="18" charset="0"/>
+                <a:cs typeface="Times New Roman" panose="02020603050405020304" pitchFamily="18" charset="0"/>
+              </a:rPr>
+              <a:t> </a:t>
+            </a:r>
+            <a:r>
+              <a:rPr lang="en-US" sz="1400" b="1" dirty="0">
+                <a:solidFill>
+                  <a:srgbClr val="6A3E3E"/>
+                </a:solidFill>
+                <a:latin typeface="Times New Roman" panose="02020603050405020304" pitchFamily="18" charset="0"/>
+                <a:cs typeface="Times New Roman" panose="02020603050405020304" pitchFamily="18" charset="0"/>
+              </a:rPr>
+              <a:t>_flag</a:t>
+            </a:r>
+            <a:r>
+              <a:rPr lang="en-US" sz="1400" b="1" dirty="0">
+                <a:solidFill>
+                  <a:srgbClr val="000000"/>
+                </a:solidFill>
+                <a:latin typeface="Times New Roman" panose="02020603050405020304" pitchFamily="18" charset="0"/>
+                <a:cs typeface="Times New Roman" panose="02020603050405020304" pitchFamily="18" charset="0"/>
+              </a:rPr>
+              <a:t>)    </a:t>
+            </a:r>
+          </a:p>
+          <a:p>
+            <a:r>
+              <a:rPr lang="en-US" sz="1400" dirty="0">
+                <a:solidFill>
+                  <a:srgbClr val="000000"/>
+                </a:solidFill>
+                <a:latin typeface="Times New Roman" panose="02020603050405020304" pitchFamily="18" charset="0"/>
+                <a:cs typeface="Times New Roman" panose="02020603050405020304" pitchFamily="18" charset="0"/>
+              </a:rPr>
+              <a:t>        {</a:t>
+            </a:r>
+          </a:p>
+          <a:p>
+            <a:r>
+              <a:rPr lang="en-US" sz="1400" dirty="0">
+                <a:solidFill>
+                  <a:srgbClr val="000000"/>
+                </a:solidFill>
+                <a:latin typeface="Times New Roman" panose="02020603050405020304" pitchFamily="18" charset="0"/>
+                <a:cs typeface="Times New Roman" panose="02020603050405020304" pitchFamily="18" charset="0"/>
+              </a:rPr>
+              <a:t>                </a:t>
+            </a:r>
+            <a:r>
+              <a:rPr lang="en-US" sz="1400" b="1" dirty="0" err="1">
+                <a:solidFill>
+                  <a:srgbClr val="7F0055"/>
+                </a:solidFill>
+                <a:latin typeface="Times New Roman" panose="02020603050405020304" pitchFamily="18" charset="0"/>
+                <a:cs typeface="Times New Roman" panose="02020603050405020304" pitchFamily="18" charset="0"/>
+              </a:rPr>
+              <a:t>this</a:t>
+            </a:r>
+            <a:r>
+              <a:rPr lang="en-US" sz="1400" b="1" dirty="0" err="1">
+                <a:solidFill>
+                  <a:srgbClr val="000000"/>
+                </a:solidFill>
+                <a:latin typeface="Times New Roman" panose="02020603050405020304" pitchFamily="18" charset="0"/>
+                <a:cs typeface="Times New Roman" panose="02020603050405020304" pitchFamily="18" charset="0"/>
+              </a:rPr>
+              <a:t>.</a:t>
+            </a:r>
+            <a:r>
+              <a:rPr lang="en-US" sz="1400" b="1" dirty="0" err="1">
+                <a:solidFill>
+                  <a:srgbClr val="0000C0"/>
+                </a:solidFill>
+                <a:latin typeface="Times New Roman" panose="02020603050405020304" pitchFamily="18" charset="0"/>
+                <a:cs typeface="Times New Roman" panose="02020603050405020304" pitchFamily="18" charset="0"/>
+              </a:rPr>
+              <a:t>_flag</a:t>
+            </a:r>
+            <a:r>
+              <a:rPr lang="en-US" sz="1400" b="1" dirty="0">
+                <a:solidFill>
+                  <a:srgbClr val="000000"/>
+                </a:solidFill>
+                <a:latin typeface="Times New Roman" panose="02020603050405020304" pitchFamily="18" charset="0"/>
+                <a:cs typeface="Times New Roman" panose="02020603050405020304" pitchFamily="18" charset="0"/>
+              </a:rPr>
+              <a:t>=</a:t>
+            </a:r>
+            <a:r>
+              <a:rPr lang="en-US" sz="1400" b="1" dirty="0">
+                <a:solidFill>
+                  <a:srgbClr val="6A3E3E"/>
+                </a:solidFill>
+                <a:latin typeface="Times New Roman" panose="02020603050405020304" pitchFamily="18" charset="0"/>
+                <a:cs typeface="Times New Roman" panose="02020603050405020304" pitchFamily="18" charset="0"/>
+              </a:rPr>
+              <a:t>_flag</a:t>
+            </a:r>
+            <a:r>
+              <a:rPr lang="en-US" sz="1400" b="1" dirty="0">
+                <a:solidFill>
+                  <a:srgbClr val="000000"/>
+                </a:solidFill>
+                <a:latin typeface="Times New Roman" panose="02020603050405020304" pitchFamily="18" charset="0"/>
+                <a:cs typeface="Times New Roman" panose="02020603050405020304" pitchFamily="18" charset="0"/>
+              </a:rPr>
+              <a:t>;</a:t>
+            </a:r>
+          </a:p>
+          <a:p>
+            <a:r>
+              <a:rPr lang="en-US" sz="1400" dirty="0">
+                <a:solidFill>
+                  <a:srgbClr val="000000"/>
+                </a:solidFill>
+                <a:latin typeface="Times New Roman" panose="02020603050405020304" pitchFamily="18" charset="0"/>
+                <a:cs typeface="Times New Roman" panose="02020603050405020304" pitchFamily="18" charset="0"/>
+              </a:rPr>
+              <a:t>                </a:t>
+            </a:r>
+            <a:r>
+              <a:rPr lang="en-US" sz="1400" dirty="0">
+                <a:solidFill>
+                  <a:srgbClr val="3F7F5F"/>
+                </a:solidFill>
+                <a:latin typeface="Times New Roman" panose="02020603050405020304" pitchFamily="18" charset="0"/>
+                <a:cs typeface="Times New Roman" panose="02020603050405020304" pitchFamily="18" charset="0"/>
+              </a:rPr>
+              <a:t>//flag value changed .So notify observer(s)</a:t>
+            </a:r>
+          </a:p>
+          <a:p>
+            <a:r>
+              <a:rPr lang="en-US" sz="1400" dirty="0">
+                <a:solidFill>
+                  <a:srgbClr val="000000"/>
+                </a:solidFill>
+                <a:latin typeface="Times New Roman" panose="02020603050405020304" pitchFamily="18" charset="0"/>
+                <a:cs typeface="Times New Roman" panose="02020603050405020304" pitchFamily="18" charset="0"/>
+              </a:rPr>
+              <a:t>                 </a:t>
+            </a:r>
+            <a:r>
+              <a:rPr lang="en-US" sz="1400" dirty="0" err="1">
+                <a:solidFill>
+                  <a:srgbClr val="000000"/>
+                </a:solidFill>
+                <a:latin typeface="Times New Roman" panose="02020603050405020304" pitchFamily="18" charset="0"/>
+                <a:cs typeface="Times New Roman" panose="02020603050405020304" pitchFamily="18" charset="0"/>
+              </a:rPr>
+              <a:t>notifyObservers</a:t>
+            </a:r>
+            <a:r>
+              <a:rPr lang="en-US" sz="1400" dirty="0">
+                <a:solidFill>
+                  <a:srgbClr val="000000"/>
+                </a:solidFill>
+                <a:latin typeface="Times New Roman" panose="02020603050405020304" pitchFamily="18" charset="0"/>
+                <a:cs typeface="Times New Roman" panose="02020603050405020304" pitchFamily="18" charset="0"/>
+              </a:rPr>
+              <a:t>();</a:t>
+            </a:r>
+          </a:p>
+          <a:p>
+            <a:r>
+              <a:rPr lang="en-US" sz="1400" dirty="0">
+                <a:solidFill>
+                  <a:srgbClr val="000000"/>
+                </a:solidFill>
+                <a:latin typeface="Times New Roman" panose="02020603050405020304" pitchFamily="18" charset="0"/>
+                <a:cs typeface="Times New Roman" panose="02020603050405020304" pitchFamily="18" charset="0"/>
+              </a:rPr>
+              <a:t>        }</a:t>
+            </a:r>
+          </a:p>
+          <a:p>
+            <a:r>
+              <a:rPr lang="en-US" sz="1400" dirty="0">
+                <a:solidFill>
+                  <a:srgbClr val="000000"/>
+                </a:solidFill>
+                <a:latin typeface="Times New Roman" panose="02020603050405020304" pitchFamily="18" charset="0"/>
+                <a:cs typeface="Times New Roman" panose="02020603050405020304" pitchFamily="18" charset="0"/>
+              </a:rPr>
+              <a:t>        </a:t>
+            </a:r>
+            <a:endParaRPr lang="en-US" sz="1400" dirty="0">
+              <a:latin typeface="Times New Roman" panose="02020603050405020304" pitchFamily="18" charset="0"/>
+              <a:cs typeface="Times New Roman" panose="02020603050405020304" pitchFamily="18" charset="0"/>
+            </a:endParaRPr>
+          </a:p>
+        </p:txBody>
+      </p:sp>
+      <p:sp>
+        <p:nvSpPr>
+          <p:cNvPr id="3" name="Rectangle 2"/>
+          <p:cNvSpPr/>
+          <p:nvPr/>
+        </p:nvSpPr>
+        <p:spPr>
+          <a:xfrm>
+            <a:off x="6553200" y="2603989"/>
+            <a:ext cx="6096000" cy="4185761"/>
+          </a:xfrm>
+          <a:prstGeom prst="rect">
+            <a:avLst/>
+          </a:prstGeom>
+        </p:spPr>
+        <p:txBody>
+          <a:bodyPr>
+            <a:spAutoFit/>
+          </a:bodyPr>
+          <a:lstStyle/>
+          <a:p>
+            <a:r>
+              <a:rPr lang="en-US" sz="1400" dirty="0">
+                <a:solidFill>
+                  <a:srgbClr val="646464"/>
+                </a:solidFill>
+                <a:latin typeface="Times New Roman" panose="02020603050405020304" pitchFamily="18" charset="0"/>
+                <a:cs typeface="Times New Roman" panose="02020603050405020304" pitchFamily="18" charset="0"/>
+              </a:rPr>
+              <a:t>@Override</a:t>
+            </a:r>
+          </a:p>
+          <a:p>
+            <a:r>
+              <a:rPr lang="en-US" sz="1400" dirty="0">
+                <a:solidFill>
+                  <a:srgbClr val="000000"/>
+                </a:solidFill>
+                <a:latin typeface="Times New Roman" panose="02020603050405020304" pitchFamily="18" charset="0"/>
+                <a:cs typeface="Times New Roman" panose="02020603050405020304" pitchFamily="18" charset="0"/>
+              </a:rPr>
+              <a:t>        </a:t>
+            </a:r>
+            <a:r>
+              <a:rPr lang="en-US" sz="1400" b="1" dirty="0">
+                <a:solidFill>
+                  <a:srgbClr val="7F0055"/>
+                </a:solidFill>
+                <a:latin typeface="Times New Roman" panose="02020603050405020304" pitchFamily="18" charset="0"/>
+                <a:cs typeface="Times New Roman" panose="02020603050405020304" pitchFamily="18" charset="0"/>
+              </a:rPr>
+              <a:t>public</a:t>
+            </a:r>
+            <a:r>
+              <a:rPr lang="en-US" sz="1400" b="1" dirty="0">
+                <a:solidFill>
+                  <a:srgbClr val="000000"/>
+                </a:solidFill>
+                <a:latin typeface="Times New Roman" panose="02020603050405020304" pitchFamily="18" charset="0"/>
+                <a:cs typeface="Times New Roman" panose="02020603050405020304" pitchFamily="18" charset="0"/>
+              </a:rPr>
+              <a:t> </a:t>
+            </a:r>
+            <a:r>
+              <a:rPr lang="en-US" sz="1400" b="1" dirty="0">
+                <a:solidFill>
+                  <a:srgbClr val="7F0055"/>
+                </a:solidFill>
+                <a:latin typeface="Times New Roman" panose="02020603050405020304" pitchFamily="18" charset="0"/>
+                <a:cs typeface="Times New Roman" panose="02020603050405020304" pitchFamily="18" charset="0"/>
+              </a:rPr>
+              <a:t>void</a:t>
+            </a:r>
+            <a:r>
+              <a:rPr lang="en-US" sz="1400" b="1" dirty="0">
+                <a:solidFill>
+                  <a:srgbClr val="000000"/>
+                </a:solidFill>
+                <a:latin typeface="Times New Roman" panose="02020603050405020304" pitchFamily="18" charset="0"/>
+                <a:cs typeface="Times New Roman" panose="02020603050405020304" pitchFamily="18" charset="0"/>
+              </a:rPr>
+              <a:t> register(Observer </a:t>
+            </a:r>
+            <a:r>
+              <a:rPr lang="en-US" sz="1400" b="1" dirty="0">
+                <a:solidFill>
+                  <a:srgbClr val="6A3E3E"/>
+                </a:solidFill>
+                <a:latin typeface="Times New Roman" panose="02020603050405020304" pitchFamily="18" charset="0"/>
+                <a:cs typeface="Times New Roman" panose="02020603050405020304" pitchFamily="18" charset="0"/>
+              </a:rPr>
+              <a:t>o</a:t>
+            </a:r>
+            <a:r>
+              <a:rPr lang="en-US" sz="1400" b="1" dirty="0">
+                <a:solidFill>
+                  <a:srgbClr val="000000"/>
+                </a:solidFill>
+                <a:latin typeface="Times New Roman" panose="02020603050405020304" pitchFamily="18" charset="0"/>
+                <a:cs typeface="Times New Roman" panose="02020603050405020304" pitchFamily="18" charset="0"/>
+              </a:rPr>
+              <a:t>)</a:t>
+            </a:r>
+          </a:p>
+          <a:p>
+            <a:r>
+              <a:rPr lang="en-US" sz="1400" dirty="0">
+                <a:solidFill>
+                  <a:srgbClr val="000000"/>
+                </a:solidFill>
+                <a:latin typeface="Times New Roman" panose="02020603050405020304" pitchFamily="18" charset="0"/>
+                <a:cs typeface="Times New Roman" panose="02020603050405020304" pitchFamily="18" charset="0"/>
+              </a:rPr>
+              <a:t>        { </a:t>
+            </a:r>
+          </a:p>
+          <a:p>
+            <a:r>
+              <a:rPr lang="en-US" sz="1400" dirty="0">
+                <a:solidFill>
+                  <a:srgbClr val="000000"/>
+                </a:solidFill>
+                <a:latin typeface="Times New Roman" panose="02020603050405020304" pitchFamily="18" charset="0"/>
+                <a:cs typeface="Times New Roman" panose="02020603050405020304" pitchFamily="18" charset="0"/>
+              </a:rPr>
+              <a:t>            </a:t>
+            </a:r>
+            <a:r>
+              <a:rPr lang="en-US" sz="1400" dirty="0" err="1">
+                <a:solidFill>
+                  <a:srgbClr val="0000C0"/>
+                </a:solidFill>
+                <a:latin typeface="Times New Roman" panose="02020603050405020304" pitchFamily="18" charset="0"/>
+                <a:cs typeface="Times New Roman" panose="02020603050405020304" pitchFamily="18" charset="0"/>
+              </a:rPr>
+              <a:t>observerList</a:t>
+            </a:r>
+            <a:r>
+              <a:rPr lang="en-US" sz="1400" dirty="0" err="1">
+                <a:solidFill>
+                  <a:srgbClr val="000000"/>
+                </a:solidFill>
+                <a:latin typeface="Times New Roman" panose="02020603050405020304" pitchFamily="18" charset="0"/>
+                <a:cs typeface="Times New Roman" panose="02020603050405020304" pitchFamily="18" charset="0"/>
+              </a:rPr>
+              <a:t>.add</a:t>
+            </a:r>
+            <a:r>
+              <a:rPr lang="en-US" sz="1400" dirty="0">
+                <a:solidFill>
+                  <a:srgbClr val="000000"/>
+                </a:solidFill>
+                <a:latin typeface="Times New Roman" panose="02020603050405020304" pitchFamily="18" charset="0"/>
+                <a:cs typeface="Times New Roman" panose="02020603050405020304" pitchFamily="18" charset="0"/>
+              </a:rPr>
+              <a:t>(</a:t>
+            </a:r>
+            <a:r>
+              <a:rPr lang="en-US" sz="1400" dirty="0">
+                <a:solidFill>
+                  <a:srgbClr val="6A3E3E"/>
+                </a:solidFill>
+                <a:latin typeface="Times New Roman" panose="02020603050405020304" pitchFamily="18" charset="0"/>
+                <a:cs typeface="Times New Roman" panose="02020603050405020304" pitchFamily="18" charset="0"/>
+              </a:rPr>
+              <a:t>o</a:t>
+            </a:r>
+            <a:r>
+              <a:rPr lang="en-US" sz="1400" dirty="0">
+                <a:solidFill>
+                  <a:srgbClr val="000000"/>
+                </a:solidFill>
+                <a:latin typeface="Times New Roman" panose="02020603050405020304" pitchFamily="18" charset="0"/>
+                <a:cs typeface="Times New Roman" panose="02020603050405020304" pitchFamily="18" charset="0"/>
+              </a:rPr>
+              <a:t>);</a:t>
+            </a:r>
+          </a:p>
+          <a:p>
+            <a:r>
+              <a:rPr lang="en-US" sz="1400" dirty="0">
+                <a:solidFill>
+                  <a:srgbClr val="000000"/>
+                </a:solidFill>
+                <a:latin typeface="Times New Roman" panose="02020603050405020304" pitchFamily="18" charset="0"/>
+                <a:cs typeface="Times New Roman" panose="02020603050405020304" pitchFamily="18" charset="0"/>
+              </a:rPr>
+              <a:t>        }</a:t>
+            </a:r>
+          </a:p>
+          <a:p>
+            <a:r>
+              <a:rPr lang="en-US" sz="1400" dirty="0">
+                <a:solidFill>
+                  <a:srgbClr val="000000"/>
+                </a:solidFill>
+                <a:latin typeface="Times New Roman" panose="02020603050405020304" pitchFamily="18" charset="0"/>
+                <a:cs typeface="Times New Roman" panose="02020603050405020304" pitchFamily="18" charset="0"/>
+              </a:rPr>
+              <a:t>        </a:t>
+            </a:r>
+            <a:r>
+              <a:rPr lang="en-US" sz="1400" dirty="0">
+                <a:solidFill>
+                  <a:srgbClr val="646464"/>
+                </a:solidFill>
+                <a:latin typeface="Times New Roman" panose="02020603050405020304" pitchFamily="18" charset="0"/>
+                <a:cs typeface="Times New Roman" panose="02020603050405020304" pitchFamily="18" charset="0"/>
+              </a:rPr>
+              <a:t>@Override</a:t>
+            </a:r>
+          </a:p>
+          <a:p>
+            <a:r>
+              <a:rPr lang="en-US" sz="1400" dirty="0">
+                <a:solidFill>
+                  <a:srgbClr val="000000"/>
+                </a:solidFill>
+                <a:latin typeface="Times New Roman" panose="02020603050405020304" pitchFamily="18" charset="0"/>
+                <a:cs typeface="Times New Roman" panose="02020603050405020304" pitchFamily="18" charset="0"/>
+              </a:rPr>
+              <a:t>        </a:t>
+            </a:r>
+            <a:r>
+              <a:rPr lang="en-US" sz="1400" b="1" dirty="0">
+                <a:solidFill>
+                  <a:srgbClr val="7F0055"/>
+                </a:solidFill>
+                <a:latin typeface="Times New Roman" panose="02020603050405020304" pitchFamily="18" charset="0"/>
+                <a:cs typeface="Times New Roman" panose="02020603050405020304" pitchFamily="18" charset="0"/>
+              </a:rPr>
+              <a:t>public</a:t>
+            </a:r>
+            <a:r>
+              <a:rPr lang="en-US" sz="1400" b="1" dirty="0">
+                <a:solidFill>
+                  <a:srgbClr val="000000"/>
+                </a:solidFill>
+                <a:latin typeface="Times New Roman" panose="02020603050405020304" pitchFamily="18" charset="0"/>
+                <a:cs typeface="Times New Roman" panose="02020603050405020304" pitchFamily="18" charset="0"/>
+              </a:rPr>
+              <a:t> </a:t>
+            </a:r>
+            <a:r>
+              <a:rPr lang="en-US" sz="1400" b="1" dirty="0">
+                <a:solidFill>
+                  <a:srgbClr val="7F0055"/>
+                </a:solidFill>
+                <a:latin typeface="Times New Roman" panose="02020603050405020304" pitchFamily="18" charset="0"/>
+                <a:cs typeface="Times New Roman" panose="02020603050405020304" pitchFamily="18" charset="0"/>
+              </a:rPr>
+              <a:t>void</a:t>
+            </a:r>
+            <a:r>
+              <a:rPr lang="en-US" sz="1400" b="1" dirty="0">
+                <a:solidFill>
+                  <a:srgbClr val="000000"/>
+                </a:solidFill>
+                <a:latin typeface="Times New Roman" panose="02020603050405020304" pitchFamily="18" charset="0"/>
+                <a:cs typeface="Times New Roman" panose="02020603050405020304" pitchFamily="18" charset="0"/>
+              </a:rPr>
+              <a:t> unregister(Observer </a:t>
+            </a:r>
+            <a:r>
+              <a:rPr lang="en-US" sz="1400" b="1" dirty="0">
+                <a:solidFill>
+                  <a:srgbClr val="6A3E3E"/>
+                </a:solidFill>
+                <a:latin typeface="Times New Roman" panose="02020603050405020304" pitchFamily="18" charset="0"/>
+                <a:cs typeface="Times New Roman" panose="02020603050405020304" pitchFamily="18" charset="0"/>
+              </a:rPr>
+              <a:t>o</a:t>
+            </a:r>
+            <a:r>
+              <a:rPr lang="en-US" sz="1400" b="1" dirty="0">
+                <a:solidFill>
+                  <a:srgbClr val="000000"/>
+                </a:solidFill>
+                <a:latin typeface="Times New Roman" panose="02020603050405020304" pitchFamily="18" charset="0"/>
+                <a:cs typeface="Times New Roman" panose="02020603050405020304" pitchFamily="18" charset="0"/>
+              </a:rPr>
+              <a:t>)</a:t>
+            </a:r>
+          </a:p>
+          <a:p>
+            <a:r>
+              <a:rPr lang="en-US" sz="1400" dirty="0">
+                <a:solidFill>
+                  <a:srgbClr val="000000"/>
+                </a:solidFill>
+                <a:latin typeface="Times New Roman" panose="02020603050405020304" pitchFamily="18" charset="0"/>
+                <a:cs typeface="Times New Roman" panose="02020603050405020304" pitchFamily="18" charset="0"/>
+              </a:rPr>
+              <a:t>        {</a:t>
+            </a:r>
+          </a:p>
+          <a:p>
+            <a:r>
+              <a:rPr lang="en-US" sz="1400" dirty="0">
+                <a:solidFill>
+                  <a:srgbClr val="000000"/>
+                </a:solidFill>
+                <a:latin typeface="Times New Roman" panose="02020603050405020304" pitchFamily="18" charset="0"/>
+                <a:cs typeface="Times New Roman" panose="02020603050405020304" pitchFamily="18" charset="0"/>
+              </a:rPr>
+              <a:t>            </a:t>
+            </a:r>
+            <a:r>
+              <a:rPr lang="en-US" sz="1400" dirty="0" err="1">
+                <a:solidFill>
+                  <a:srgbClr val="0000C0"/>
+                </a:solidFill>
+                <a:latin typeface="Times New Roman" panose="02020603050405020304" pitchFamily="18" charset="0"/>
+                <a:cs typeface="Times New Roman" panose="02020603050405020304" pitchFamily="18" charset="0"/>
+              </a:rPr>
+              <a:t>observerList</a:t>
+            </a:r>
+            <a:r>
+              <a:rPr lang="en-US" sz="1400" dirty="0" err="1">
+                <a:solidFill>
+                  <a:srgbClr val="000000"/>
+                </a:solidFill>
+                <a:latin typeface="Times New Roman" panose="02020603050405020304" pitchFamily="18" charset="0"/>
+                <a:cs typeface="Times New Roman" panose="02020603050405020304" pitchFamily="18" charset="0"/>
+              </a:rPr>
+              <a:t>.remove</a:t>
+            </a:r>
+            <a:r>
+              <a:rPr lang="en-US" sz="1400" dirty="0">
+                <a:solidFill>
+                  <a:srgbClr val="000000"/>
+                </a:solidFill>
+                <a:latin typeface="Times New Roman" panose="02020603050405020304" pitchFamily="18" charset="0"/>
+                <a:cs typeface="Times New Roman" panose="02020603050405020304" pitchFamily="18" charset="0"/>
+              </a:rPr>
+              <a:t>(</a:t>
+            </a:r>
+            <a:r>
+              <a:rPr lang="en-US" sz="1400" dirty="0">
+                <a:solidFill>
+                  <a:srgbClr val="6A3E3E"/>
+                </a:solidFill>
+                <a:latin typeface="Times New Roman" panose="02020603050405020304" pitchFamily="18" charset="0"/>
+                <a:cs typeface="Times New Roman" panose="02020603050405020304" pitchFamily="18" charset="0"/>
+              </a:rPr>
+              <a:t>o</a:t>
+            </a:r>
+            <a:r>
+              <a:rPr lang="en-US" sz="1400" dirty="0">
+                <a:solidFill>
+                  <a:srgbClr val="000000"/>
+                </a:solidFill>
+                <a:latin typeface="Times New Roman" panose="02020603050405020304" pitchFamily="18" charset="0"/>
+                <a:cs typeface="Times New Roman" panose="02020603050405020304" pitchFamily="18" charset="0"/>
+              </a:rPr>
+              <a:t>);</a:t>
+            </a:r>
+          </a:p>
+          <a:p>
+            <a:r>
+              <a:rPr lang="en-US" sz="1400" dirty="0">
+                <a:solidFill>
+                  <a:srgbClr val="000000"/>
+                </a:solidFill>
+                <a:latin typeface="Times New Roman" panose="02020603050405020304" pitchFamily="18" charset="0"/>
+                <a:cs typeface="Times New Roman" panose="02020603050405020304" pitchFamily="18" charset="0"/>
+              </a:rPr>
+              <a:t>        }</a:t>
+            </a:r>
+          </a:p>
+          <a:p>
+            <a:r>
+              <a:rPr lang="en-US" sz="1400" dirty="0">
+                <a:solidFill>
+                  <a:srgbClr val="000000"/>
+                </a:solidFill>
+                <a:latin typeface="Times New Roman" panose="02020603050405020304" pitchFamily="18" charset="0"/>
+                <a:cs typeface="Times New Roman" panose="02020603050405020304" pitchFamily="18" charset="0"/>
+              </a:rPr>
+              <a:t>        </a:t>
+            </a:r>
+            <a:r>
+              <a:rPr lang="en-US" sz="1400" dirty="0">
+                <a:solidFill>
+                  <a:srgbClr val="646464"/>
+                </a:solidFill>
+                <a:latin typeface="Times New Roman" panose="02020603050405020304" pitchFamily="18" charset="0"/>
+                <a:cs typeface="Times New Roman" panose="02020603050405020304" pitchFamily="18" charset="0"/>
+              </a:rPr>
+              <a:t>@Override</a:t>
+            </a:r>
+          </a:p>
+          <a:p>
+            <a:r>
+              <a:rPr lang="en-US" sz="1400" dirty="0">
+                <a:solidFill>
+                  <a:srgbClr val="000000"/>
+                </a:solidFill>
+                <a:latin typeface="Times New Roman" panose="02020603050405020304" pitchFamily="18" charset="0"/>
+                <a:cs typeface="Times New Roman" panose="02020603050405020304" pitchFamily="18" charset="0"/>
+              </a:rPr>
+              <a:t>        </a:t>
+            </a:r>
+            <a:r>
+              <a:rPr lang="en-US" sz="1400" b="1" dirty="0">
+                <a:solidFill>
+                  <a:srgbClr val="7F0055"/>
+                </a:solidFill>
+                <a:latin typeface="Times New Roman" panose="02020603050405020304" pitchFamily="18" charset="0"/>
+                <a:cs typeface="Times New Roman" panose="02020603050405020304" pitchFamily="18" charset="0"/>
+              </a:rPr>
+              <a:t>public</a:t>
+            </a:r>
+            <a:r>
+              <a:rPr lang="en-US" sz="1400" b="1" dirty="0">
+                <a:solidFill>
+                  <a:srgbClr val="000000"/>
+                </a:solidFill>
+                <a:latin typeface="Times New Roman" panose="02020603050405020304" pitchFamily="18" charset="0"/>
+                <a:cs typeface="Times New Roman" panose="02020603050405020304" pitchFamily="18" charset="0"/>
+              </a:rPr>
+              <a:t> </a:t>
+            </a:r>
+            <a:r>
+              <a:rPr lang="en-US" sz="1400" b="1" dirty="0">
+                <a:solidFill>
+                  <a:srgbClr val="7F0055"/>
+                </a:solidFill>
+                <a:latin typeface="Times New Roman" panose="02020603050405020304" pitchFamily="18" charset="0"/>
+                <a:cs typeface="Times New Roman" panose="02020603050405020304" pitchFamily="18" charset="0"/>
+              </a:rPr>
+              <a:t>void</a:t>
+            </a:r>
+            <a:r>
+              <a:rPr lang="en-US" sz="1400" b="1" dirty="0">
+                <a:solidFill>
+                  <a:srgbClr val="000000"/>
+                </a:solidFill>
+                <a:latin typeface="Times New Roman" panose="02020603050405020304" pitchFamily="18" charset="0"/>
+                <a:cs typeface="Times New Roman" panose="02020603050405020304" pitchFamily="18" charset="0"/>
+              </a:rPr>
+              <a:t> </a:t>
+            </a:r>
+            <a:r>
+              <a:rPr lang="en-US" sz="1400" b="1" dirty="0" err="1">
+                <a:solidFill>
+                  <a:srgbClr val="000000"/>
+                </a:solidFill>
+                <a:latin typeface="Times New Roman" panose="02020603050405020304" pitchFamily="18" charset="0"/>
+                <a:cs typeface="Times New Roman" panose="02020603050405020304" pitchFamily="18" charset="0"/>
+              </a:rPr>
+              <a:t>notifyObservers</a:t>
+            </a:r>
+            <a:r>
+              <a:rPr lang="en-US" sz="1400" b="1" dirty="0">
+                <a:solidFill>
+                  <a:srgbClr val="000000"/>
+                </a:solidFill>
+                <a:latin typeface="Times New Roman" panose="02020603050405020304" pitchFamily="18" charset="0"/>
+                <a:cs typeface="Times New Roman" panose="02020603050405020304" pitchFamily="18" charset="0"/>
+              </a:rPr>
+              <a:t>() </a:t>
+            </a:r>
+          </a:p>
+          <a:p>
+            <a:r>
+              <a:rPr lang="en-US" sz="1400" dirty="0">
+                <a:solidFill>
+                  <a:srgbClr val="000000"/>
+                </a:solidFill>
+                <a:latin typeface="Times New Roman" panose="02020603050405020304" pitchFamily="18" charset="0"/>
+                <a:cs typeface="Times New Roman" panose="02020603050405020304" pitchFamily="18" charset="0"/>
+              </a:rPr>
+              <a:t>        { </a:t>
+            </a:r>
+          </a:p>
+          <a:p>
+            <a:r>
+              <a:rPr lang="en-US" sz="1400" dirty="0">
+                <a:solidFill>
+                  <a:srgbClr val="000000"/>
+                </a:solidFill>
+                <a:latin typeface="Times New Roman" panose="02020603050405020304" pitchFamily="18" charset="0"/>
+                <a:cs typeface="Times New Roman" panose="02020603050405020304" pitchFamily="18" charset="0"/>
+              </a:rPr>
+              <a:t>           </a:t>
+            </a:r>
+            <a:r>
+              <a:rPr lang="en-US" sz="1400" b="1" dirty="0">
+                <a:solidFill>
+                  <a:srgbClr val="7F0055"/>
+                </a:solidFill>
+                <a:latin typeface="Times New Roman" panose="02020603050405020304" pitchFamily="18" charset="0"/>
+                <a:cs typeface="Times New Roman" panose="02020603050405020304" pitchFamily="18" charset="0"/>
+              </a:rPr>
+              <a:t>for</a:t>
+            </a:r>
+            <a:r>
+              <a:rPr lang="en-US" sz="1400" b="1" dirty="0">
+                <a:solidFill>
+                  <a:srgbClr val="000000"/>
+                </a:solidFill>
+                <a:latin typeface="Times New Roman" panose="02020603050405020304" pitchFamily="18" charset="0"/>
+                <a:cs typeface="Times New Roman" panose="02020603050405020304" pitchFamily="18" charset="0"/>
+              </a:rPr>
+              <a:t>(</a:t>
+            </a:r>
+            <a:r>
+              <a:rPr lang="en-US" sz="1400" b="1" dirty="0" err="1">
+                <a:solidFill>
+                  <a:srgbClr val="7F0055"/>
+                </a:solidFill>
+                <a:latin typeface="Times New Roman" panose="02020603050405020304" pitchFamily="18" charset="0"/>
+                <a:cs typeface="Times New Roman" panose="02020603050405020304" pitchFamily="18" charset="0"/>
+              </a:rPr>
+              <a:t>int</a:t>
+            </a:r>
+            <a:r>
+              <a:rPr lang="en-US" sz="1400" b="1" dirty="0">
+                <a:solidFill>
+                  <a:srgbClr val="000000"/>
+                </a:solidFill>
+                <a:latin typeface="Times New Roman" panose="02020603050405020304" pitchFamily="18" charset="0"/>
+                <a:cs typeface="Times New Roman" panose="02020603050405020304" pitchFamily="18" charset="0"/>
+              </a:rPr>
+              <a:t> </a:t>
+            </a:r>
+            <a:r>
+              <a:rPr lang="en-US" sz="1400" b="1" dirty="0" err="1">
+                <a:solidFill>
+                  <a:srgbClr val="6A3E3E"/>
+                </a:solidFill>
+                <a:latin typeface="Times New Roman" panose="02020603050405020304" pitchFamily="18" charset="0"/>
+                <a:cs typeface="Times New Roman" panose="02020603050405020304" pitchFamily="18" charset="0"/>
+              </a:rPr>
+              <a:t>i</a:t>
+            </a:r>
+            <a:r>
+              <a:rPr lang="en-US" sz="1400" b="1" dirty="0">
+                <a:solidFill>
+                  <a:srgbClr val="000000"/>
+                </a:solidFill>
+                <a:latin typeface="Times New Roman" panose="02020603050405020304" pitchFamily="18" charset="0"/>
+                <a:cs typeface="Times New Roman" panose="02020603050405020304" pitchFamily="18" charset="0"/>
+              </a:rPr>
+              <a:t>=0;</a:t>
+            </a:r>
+            <a:r>
+              <a:rPr lang="en-US" sz="1400" b="1" dirty="0">
+                <a:solidFill>
+                  <a:srgbClr val="6A3E3E"/>
+                </a:solidFill>
+                <a:latin typeface="Times New Roman" panose="02020603050405020304" pitchFamily="18" charset="0"/>
+                <a:cs typeface="Times New Roman" panose="02020603050405020304" pitchFamily="18" charset="0"/>
+              </a:rPr>
+              <a:t>i</a:t>
+            </a:r>
+            <a:r>
+              <a:rPr lang="en-US" sz="1400" b="1" dirty="0">
+                <a:solidFill>
+                  <a:srgbClr val="000000"/>
+                </a:solidFill>
+                <a:latin typeface="Times New Roman" panose="02020603050405020304" pitchFamily="18" charset="0"/>
+                <a:cs typeface="Times New Roman" panose="02020603050405020304" pitchFamily="18" charset="0"/>
+              </a:rPr>
+              <a:t>&lt;</a:t>
+            </a:r>
+            <a:r>
+              <a:rPr lang="en-US" sz="1400" b="1" dirty="0" err="1">
+                <a:solidFill>
+                  <a:srgbClr val="0000C0"/>
+                </a:solidFill>
+                <a:latin typeface="Times New Roman" panose="02020603050405020304" pitchFamily="18" charset="0"/>
+                <a:cs typeface="Times New Roman" panose="02020603050405020304" pitchFamily="18" charset="0"/>
+              </a:rPr>
+              <a:t>observerList</a:t>
+            </a:r>
+            <a:r>
+              <a:rPr lang="en-US" sz="1400" b="1" dirty="0" err="1">
+                <a:solidFill>
+                  <a:srgbClr val="000000"/>
+                </a:solidFill>
+                <a:latin typeface="Times New Roman" panose="02020603050405020304" pitchFamily="18" charset="0"/>
+                <a:cs typeface="Times New Roman" panose="02020603050405020304" pitchFamily="18" charset="0"/>
+              </a:rPr>
+              <a:t>.size</a:t>
+            </a:r>
+            <a:r>
+              <a:rPr lang="en-US" sz="1400" b="1" dirty="0">
+                <a:solidFill>
+                  <a:srgbClr val="000000"/>
+                </a:solidFill>
+                <a:latin typeface="Times New Roman" panose="02020603050405020304" pitchFamily="18" charset="0"/>
+                <a:cs typeface="Times New Roman" panose="02020603050405020304" pitchFamily="18" charset="0"/>
+              </a:rPr>
+              <a:t>();</a:t>
+            </a:r>
+            <a:r>
+              <a:rPr lang="en-US" sz="1400" b="1" dirty="0" err="1">
+                <a:solidFill>
+                  <a:srgbClr val="6A3E3E"/>
+                </a:solidFill>
+                <a:latin typeface="Times New Roman" panose="02020603050405020304" pitchFamily="18" charset="0"/>
+                <a:cs typeface="Times New Roman" panose="02020603050405020304" pitchFamily="18" charset="0"/>
+              </a:rPr>
+              <a:t>i</a:t>
+            </a:r>
+            <a:r>
+              <a:rPr lang="en-US" sz="1400" b="1" dirty="0">
+                <a:solidFill>
+                  <a:srgbClr val="000000"/>
+                </a:solidFill>
+                <a:latin typeface="Times New Roman" panose="02020603050405020304" pitchFamily="18" charset="0"/>
+                <a:cs typeface="Times New Roman" panose="02020603050405020304" pitchFamily="18" charset="0"/>
+              </a:rPr>
+              <a:t>++)</a:t>
+            </a:r>
+          </a:p>
+          <a:p>
+            <a:r>
+              <a:rPr lang="en-US" sz="1400" dirty="0">
+                <a:solidFill>
+                  <a:srgbClr val="000000"/>
+                </a:solidFill>
+                <a:latin typeface="Times New Roman" panose="02020603050405020304" pitchFamily="18" charset="0"/>
+                <a:cs typeface="Times New Roman" panose="02020603050405020304" pitchFamily="18" charset="0"/>
+              </a:rPr>
+              <a:t>        {</a:t>
+            </a:r>
+          </a:p>
+          <a:p>
+            <a:r>
+              <a:rPr lang="en-US" sz="1400" dirty="0">
+                <a:solidFill>
+                  <a:srgbClr val="000000"/>
+                </a:solidFill>
+                <a:latin typeface="Times New Roman" panose="02020603050405020304" pitchFamily="18" charset="0"/>
+                <a:cs typeface="Times New Roman" panose="02020603050405020304" pitchFamily="18" charset="0"/>
+              </a:rPr>
+              <a:t>        </a:t>
+            </a:r>
+            <a:r>
+              <a:rPr lang="en-US" sz="1400" dirty="0" err="1">
+                <a:solidFill>
+                  <a:srgbClr val="0000C0"/>
+                </a:solidFill>
+                <a:latin typeface="Times New Roman" panose="02020603050405020304" pitchFamily="18" charset="0"/>
+                <a:cs typeface="Times New Roman" panose="02020603050405020304" pitchFamily="18" charset="0"/>
+              </a:rPr>
+              <a:t>observerList</a:t>
+            </a:r>
+            <a:r>
+              <a:rPr lang="en-US" sz="1400" dirty="0" err="1">
+                <a:solidFill>
+                  <a:srgbClr val="000000"/>
+                </a:solidFill>
+                <a:latin typeface="Times New Roman" panose="02020603050405020304" pitchFamily="18" charset="0"/>
+                <a:cs typeface="Times New Roman" panose="02020603050405020304" pitchFamily="18" charset="0"/>
+              </a:rPr>
+              <a:t>.get</a:t>
+            </a:r>
+            <a:r>
+              <a:rPr lang="en-US" sz="1400" dirty="0">
+                <a:solidFill>
+                  <a:srgbClr val="000000"/>
+                </a:solidFill>
+                <a:latin typeface="Times New Roman" panose="02020603050405020304" pitchFamily="18" charset="0"/>
+                <a:cs typeface="Times New Roman" panose="02020603050405020304" pitchFamily="18" charset="0"/>
+              </a:rPr>
+              <a:t>(</a:t>
+            </a:r>
+            <a:r>
+              <a:rPr lang="en-US" sz="1400" dirty="0" err="1">
+                <a:solidFill>
+                  <a:srgbClr val="6A3E3E"/>
+                </a:solidFill>
+                <a:latin typeface="Times New Roman" panose="02020603050405020304" pitchFamily="18" charset="0"/>
+                <a:cs typeface="Times New Roman" panose="02020603050405020304" pitchFamily="18" charset="0"/>
+              </a:rPr>
+              <a:t>i</a:t>
+            </a:r>
+            <a:r>
+              <a:rPr lang="en-US" sz="1400" dirty="0">
+                <a:solidFill>
+                  <a:srgbClr val="000000"/>
+                </a:solidFill>
+                <a:latin typeface="Times New Roman" panose="02020603050405020304" pitchFamily="18" charset="0"/>
+                <a:cs typeface="Times New Roman" panose="02020603050405020304" pitchFamily="18" charset="0"/>
+              </a:rPr>
+              <a:t>).update();</a:t>
+            </a:r>
+          </a:p>
+          <a:p>
+            <a:r>
+              <a:rPr lang="en-US" sz="1400" dirty="0">
+                <a:solidFill>
+                  <a:srgbClr val="000000"/>
+                </a:solidFill>
+                <a:latin typeface="Times New Roman" panose="02020603050405020304" pitchFamily="18" charset="0"/>
+                <a:cs typeface="Times New Roman" panose="02020603050405020304" pitchFamily="18" charset="0"/>
+              </a:rPr>
+              <a:t>        }</a:t>
+            </a:r>
+          </a:p>
+          <a:p>
+            <a:r>
+              <a:rPr lang="en-US" sz="1400" dirty="0">
+                <a:solidFill>
+                  <a:srgbClr val="000000"/>
+                </a:solidFill>
+                <a:latin typeface="Times New Roman" panose="02020603050405020304" pitchFamily="18" charset="0"/>
+                <a:cs typeface="Times New Roman" panose="02020603050405020304" pitchFamily="18" charset="0"/>
+              </a:rPr>
+              <a:t>        }</a:t>
+            </a:r>
+          </a:p>
+          <a:p>
+            <a:r>
+              <a:rPr lang="en-US" sz="1400" dirty="0">
+                <a:solidFill>
+                  <a:srgbClr val="000000"/>
+                </a:solidFill>
+                <a:latin typeface="Times New Roman" panose="02020603050405020304" pitchFamily="18" charset="0"/>
+                <a:cs typeface="Times New Roman" panose="02020603050405020304" pitchFamily="18" charset="0"/>
+              </a:rPr>
+              <a:t>    }</a:t>
+            </a:r>
+            <a:endParaRPr lang="en-US" sz="1400" dirty="0">
               <a:latin typeface="Times New Roman" panose="02020603050405020304" pitchFamily="18" charset="0"/>
               <a:cs typeface="Times New Roman" panose="02020603050405020304" pitchFamily="18" charset="0"/>
             </a:endParaRPr>
@@ -21806,60 +23684,6 @@
           </a:p>
         </p:txBody>
       </p:sp>
-      <p:pic>
-        <p:nvPicPr>
-          <p:cNvPr id="3075" name="Picture 3" descr="Untitled"/>
-          <p:cNvPicPr>
-            <a:picLocks noChangeAspect="1" noChangeArrowheads="1"/>
-          </p:cNvPicPr>
-          <p:nvPr/>
-        </p:nvPicPr>
-        <p:blipFill>
-          <a:blip r:embed="rId3">
-            <a:extLst>
-              <a:ext uri="{28A0092B-C50C-407E-A947-70E740481C1C}">
-                <a14:useLocalDpi xmlns:a14="http://schemas.microsoft.com/office/drawing/2010/main" val="0"/>
-              </a:ext>
-            </a:extLst>
-          </a:blip>
-          <a:srcRect/>
-          <a:stretch>
-            <a:fillRect/>
-          </a:stretch>
-        </p:blipFill>
-        <p:spPr bwMode="auto">
-          <a:xfrm>
-            <a:off x="934662" y="2693718"/>
-            <a:ext cx="5429250" cy="4164282"/>
-          </a:xfrm>
-          <a:prstGeom prst="rect">
-            <a:avLst/>
-          </a:prstGeom>
-          <a:noFill/>
-          <a:ln>
-            <a:noFill/>
-          </a:ln>
-          <a:extLst>
-            <a:ext uri="{909E8E84-426E-40DD-AFC4-6F175D3DCCD1}">
-              <a14:hiddenFill xmlns:a14="http://schemas.microsoft.com/office/drawing/2010/main">
-                <a:solidFill>
-                  <a:srgbClr val="FFFFFF"/>
-                </a:solidFill>
-              </a14:hiddenFill>
-            </a:ext>
-            <a:ext uri="{91240B29-F687-4F45-9708-019B960494DF}">
-              <a14:hiddenLine xmlns:a14="http://schemas.microsoft.com/office/drawing/2010/main" w="9525">
-                <a:solidFill>
-                  <a:srgbClr val="000000"/>
-                </a:solidFill>
-                <a:miter lim="800000"/>
-                <a:headEnd/>
-                <a:tailEnd/>
-              </a14:hiddenLine>
-            </a:ext>
-          </a:extLst>
-        </p:spPr>
-      </p:pic>
       <p:sp>
         <p:nvSpPr>
           <p:cNvPr id="7" name="Rectangle 6"/>
@@ -21917,6 +23741,805 @@
               <a:t>:</a:t>
             </a:r>
             <a:endParaRPr lang="en-GB" sz="3200" dirty="0">
+              <a:latin typeface="Times New Roman" panose="02020603050405020304" pitchFamily="18" charset="0"/>
+              <a:cs typeface="Times New Roman" panose="02020603050405020304" pitchFamily="18" charset="0"/>
+            </a:endParaRPr>
+          </a:p>
+        </p:txBody>
+      </p:sp>
+      <p:sp>
+        <p:nvSpPr>
+          <p:cNvPr id="3" name="Rectangle 2"/>
+          <p:cNvSpPr/>
+          <p:nvPr/>
+        </p:nvSpPr>
+        <p:spPr>
+          <a:xfrm>
+            <a:off x="757644" y="2508746"/>
+            <a:ext cx="6096000" cy="4524315"/>
+          </a:xfrm>
+          <a:prstGeom prst="rect">
+            <a:avLst/>
+          </a:prstGeom>
+        </p:spPr>
+        <p:txBody>
+          <a:bodyPr>
+            <a:spAutoFit/>
+          </a:bodyPr>
+          <a:lstStyle/>
+          <a:p>
+            <a:r>
+              <a:rPr lang="en-US" sz="1600" b="1" dirty="0">
+                <a:solidFill>
+                  <a:srgbClr val="7F0055"/>
+                </a:solidFill>
+                <a:latin typeface="Times New Roman" panose="02020603050405020304" pitchFamily="18" charset="0"/>
+                <a:cs typeface="Times New Roman" panose="02020603050405020304" pitchFamily="18" charset="0"/>
+              </a:rPr>
+              <a:t>class</a:t>
+            </a:r>
+            <a:r>
+              <a:rPr lang="en-US" sz="1600" b="1" dirty="0">
+                <a:solidFill>
+                  <a:srgbClr val="000000"/>
+                </a:solidFill>
+                <a:latin typeface="Times New Roman" panose="02020603050405020304" pitchFamily="18" charset="0"/>
+                <a:cs typeface="Times New Roman" panose="02020603050405020304" pitchFamily="18" charset="0"/>
+              </a:rPr>
+              <a:t>  </a:t>
+            </a:r>
+            <a:r>
+              <a:rPr lang="en-US" sz="1600" b="1" dirty="0" err="1">
+                <a:solidFill>
+                  <a:srgbClr val="000000"/>
+                </a:solidFill>
+                <a:latin typeface="Times New Roman" panose="02020603050405020304" pitchFamily="18" charset="0"/>
+                <a:cs typeface="Times New Roman" panose="02020603050405020304" pitchFamily="18" charset="0"/>
+              </a:rPr>
+              <a:t>ObserverPatternEx</a:t>
+            </a:r>
+            <a:endParaRPr lang="en-US" sz="1600" b="1" dirty="0">
+              <a:solidFill>
+                <a:srgbClr val="000000"/>
+              </a:solidFill>
+              <a:latin typeface="Times New Roman" panose="02020603050405020304" pitchFamily="18" charset="0"/>
+              <a:cs typeface="Times New Roman" panose="02020603050405020304" pitchFamily="18" charset="0"/>
+            </a:endParaRPr>
+          </a:p>
+          <a:p>
+            <a:r>
+              <a:rPr lang="en-US" sz="1600" dirty="0">
+                <a:solidFill>
+                  <a:srgbClr val="000000"/>
+                </a:solidFill>
+                <a:latin typeface="Times New Roman" panose="02020603050405020304" pitchFamily="18" charset="0"/>
+                <a:cs typeface="Times New Roman" panose="02020603050405020304" pitchFamily="18" charset="0"/>
+              </a:rPr>
+              <a:t>{</a:t>
+            </a:r>
+          </a:p>
+          <a:p>
+            <a:r>
+              <a:rPr lang="en-US" sz="1600" b="1" dirty="0">
+                <a:solidFill>
+                  <a:srgbClr val="7F0055"/>
+                </a:solidFill>
+                <a:latin typeface="Times New Roman" panose="02020603050405020304" pitchFamily="18" charset="0"/>
+                <a:cs typeface="Times New Roman" panose="02020603050405020304" pitchFamily="18" charset="0"/>
+              </a:rPr>
+              <a:t>public</a:t>
+            </a:r>
+            <a:r>
+              <a:rPr lang="en-US" sz="1600" b="1" dirty="0">
+                <a:solidFill>
+                  <a:srgbClr val="000000"/>
+                </a:solidFill>
+                <a:latin typeface="Times New Roman" panose="02020603050405020304" pitchFamily="18" charset="0"/>
+                <a:cs typeface="Times New Roman" panose="02020603050405020304" pitchFamily="18" charset="0"/>
+              </a:rPr>
+              <a:t> </a:t>
+            </a:r>
+            <a:r>
+              <a:rPr lang="en-US" sz="1600" b="1" dirty="0">
+                <a:solidFill>
+                  <a:srgbClr val="7F0055"/>
+                </a:solidFill>
+                <a:latin typeface="Times New Roman" panose="02020603050405020304" pitchFamily="18" charset="0"/>
+                <a:cs typeface="Times New Roman" panose="02020603050405020304" pitchFamily="18" charset="0"/>
+              </a:rPr>
+              <a:t>static</a:t>
+            </a:r>
+            <a:r>
+              <a:rPr lang="en-US" sz="1600" b="1" dirty="0">
+                <a:solidFill>
+                  <a:srgbClr val="000000"/>
+                </a:solidFill>
+                <a:latin typeface="Times New Roman" panose="02020603050405020304" pitchFamily="18" charset="0"/>
+                <a:cs typeface="Times New Roman" panose="02020603050405020304" pitchFamily="18" charset="0"/>
+              </a:rPr>
+              <a:t> </a:t>
+            </a:r>
+            <a:r>
+              <a:rPr lang="en-US" sz="1600" b="1" dirty="0">
+                <a:solidFill>
+                  <a:srgbClr val="7F0055"/>
+                </a:solidFill>
+                <a:latin typeface="Times New Roman" panose="02020603050405020304" pitchFamily="18" charset="0"/>
+                <a:cs typeface="Times New Roman" panose="02020603050405020304" pitchFamily="18" charset="0"/>
+              </a:rPr>
+              <a:t>void</a:t>
+            </a:r>
+            <a:r>
+              <a:rPr lang="en-US" sz="1600" b="1" dirty="0">
+                <a:solidFill>
+                  <a:srgbClr val="000000"/>
+                </a:solidFill>
+                <a:latin typeface="Times New Roman" panose="02020603050405020304" pitchFamily="18" charset="0"/>
+                <a:cs typeface="Times New Roman" panose="02020603050405020304" pitchFamily="18" charset="0"/>
+              </a:rPr>
+              <a:t> main(String[] </a:t>
+            </a:r>
+            <a:r>
+              <a:rPr lang="en-US" sz="1600" b="1" dirty="0" err="1">
+                <a:solidFill>
+                  <a:srgbClr val="6A3E3E"/>
+                </a:solidFill>
+                <a:latin typeface="Times New Roman" panose="02020603050405020304" pitchFamily="18" charset="0"/>
+                <a:cs typeface="Times New Roman" panose="02020603050405020304" pitchFamily="18" charset="0"/>
+              </a:rPr>
+              <a:t>args</a:t>
+            </a:r>
+            <a:r>
+              <a:rPr lang="en-US" sz="1600" b="1" dirty="0">
+                <a:solidFill>
+                  <a:srgbClr val="000000"/>
+                </a:solidFill>
+                <a:latin typeface="Times New Roman" panose="02020603050405020304" pitchFamily="18" charset="0"/>
+                <a:cs typeface="Times New Roman" panose="02020603050405020304" pitchFamily="18" charset="0"/>
+              </a:rPr>
+              <a:t>)</a:t>
+            </a:r>
+          </a:p>
+          <a:p>
+            <a:r>
+              <a:rPr lang="en-US" sz="1600" dirty="0">
+                <a:solidFill>
+                  <a:srgbClr val="000000"/>
+                </a:solidFill>
+                <a:latin typeface="Times New Roman" panose="02020603050405020304" pitchFamily="18" charset="0"/>
+                <a:cs typeface="Times New Roman" panose="02020603050405020304" pitchFamily="18" charset="0"/>
+              </a:rPr>
+              <a:t>    {</a:t>
+            </a:r>
+          </a:p>
+          <a:p>
+            <a:r>
+              <a:rPr lang="en-US" sz="1600" dirty="0" err="1">
+                <a:solidFill>
+                  <a:srgbClr val="000000"/>
+                </a:solidFill>
+                <a:latin typeface="Times New Roman" panose="02020603050405020304" pitchFamily="18" charset="0"/>
+                <a:cs typeface="Times New Roman" panose="02020603050405020304" pitchFamily="18" charset="0"/>
+              </a:rPr>
+              <a:t>System.</a:t>
+            </a:r>
+            <a:r>
+              <a:rPr lang="en-US" sz="1600" b="1" i="1" dirty="0" err="1">
+                <a:solidFill>
+                  <a:srgbClr val="0000C0"/>
+                </a:solidFill>
+                <a:latin typeface="Times New Roman" panose="02020603050405020304" pitchFamily="18" charset="0"/>
+                <a:cs typeface="Times New Roman" panose="02020603050405020304" pitchFamily="18" charset="0"/>
+              </a:rPr>
+              <a:t>out</a:t>
+            </a:r>
+            <a:r>
+              <a:rPr lang="en-US" sz="1600" b="1" i="1" dirty="0" err="1">
+                <a:solidFill>
+                  <a:srgbClr val="000000"/>
+                </a:solidFill>
+                <a:latin typeface="Times New Roman" panose="02020603050405020304" pitchFamily="18" charset="0"/>
+                <a:cs typeface="Times New Roman" panose="02020603050405020304" pitchFamily="18" charset="0"/>
+              </a:rPr>
+              <a:t>.println</a:t>
+            </a:r>
+            <a:r>
+              <a:rPr lang="en-US" sz="1600" b="1" i="1" dirty="0">
+                <a:solidFill>
+                  <a:srgbClr val="000000"/>
+                </a:solidFill>
+                <a:latin typeface="Times New Roman" panose="02020603050405020304" pitchFamily="18" charset="0"/>
+                <a:cs typeface="Times New Roman" panose="02020603050405020304" pitchFamily="18" charset="0"/>
+              </a:rPr>
+              <a:t>(</a:t>
+            </a:r>
+            <a:r>
+              <a:rPr lang="en-US" sz="1600" b="1" i="1" dirty="0">
+                <a:solidFill>
+                  <a:srgbClr val="2A00FF"/>
+                </a:solidFill>
+                <a:latin typeface="Times New Roman" panose="02020603050405020304" pitchFamily="18" charset="0"/>
+                <a:cs typeface="Times New Roman" panose="02020603050405020304" pitchFamily="18" charset="0"/>
+              </a:rPr>
+              <a:t>"***Observer Pattern Demo***\n"</a:t>
+            </a:r>
+            <a:r>
+              <a:rPr lang="en-US" sz="1600" b="1" i="1" dirty="0">
+                <a:solidFill>
+                  <a:srgbClr val="000000"/>
+                </a:solidFill>
+                <a:latin typeface="Times New Roman" panose="02020603050405020304" pitchFamily="18" charset="0"/>
+                <a:cs typeface="Times New Roman" panose="02020603050405020304" pitchFamily="18" charset="0"/>
+              </a:rPr>
+              <a:t>);</a:t>
+            </a:r>
+          </a:p>
+          <a:p>
+            <a:r>
+              <a:rPr lang="en-US" sz="1600" dirty="0">
+                <a:solidFill>
+                  <a:srgbClr val="000000"/>
+                </a:solidFill>
+                <a:latin typeface="Times New Roman" panose="02020603050405020304" pitchFamily="18" charset="0"/>
+                <a:cs typeface="Times New Roman" panose="02020603050405020304" pitchFamily="18" charset="0"/>
+              </a:rPr>
+              <a:t>Observer </a:t>
+            </a:r>
+            <a:r>
+              <a:rPr lang="en-US" sz="1600" dirty="0">
+                <a:solidFill>
+                  <a:srgbClr val="6A3E3E"/>
+                </a:solidFill>
+                <a:latin typeface="Times New Roman" panose="02020603050405020304" pitchFamily="18" charset="0"/>
+                <a:cs typeface="Times New Roman" panose="02020603050405020304" pitchFamily="18" charset="0"/>
+              </a:rPr>
+              <a:t>o1</a:t>
+            </a:r>
+            <a:r>
+              <a:rPr lang="en-US" sz="1600" dirty="0">
+                <a:solidFill>
+                  <a:srgbClr val="000000"/>
+                </a:solidFill>
+                <a:latin typeface="Times New Roman" panose="02020603050405020304" pitchFamily="18" charset="0"/>
+                <a:cs typeface="Times New Roman" panose="02020603050405020304" pitchFamily="18" charset="0"/>
+              </a:rPr>
+              <a:t> = </a:t>
+            </a:r>
+            <a:r>
+              <a:rPr lang="en-US" sz="1600" b="1" dirty="0">
+                <a:solidFill>
+                  <a:srgbClr val="7F0055"/>
+                </a:solidFill>
+                <a:latin typeface="Times New Roman" panose="02020603050405020304" pitchFamily="18" charset="0"/>
+                <a:cs typeface="Times New Roman" panose="02020603050405020304" pitchFamily="18" charset="0"/>
+              </a:rPr>
+              <a:t>new</a:t>
+            </a:r>
+            <a:r>
+              <a:rPr lang="en-US" sz="1600" b="1" dirty="0">
+                <a:solidFill>
+                  <a:srgbClr val="000000"/>
+                </a:solidFill>
+                <a:latin typeface="Times New Roman" panose="02020603050405020304" pitchFamily="18" charset="0"/>
+                <a:cs typeface="Times New Roman" panose="02020603050405020304" pitchFamily="18" charset="0"/>
+              </a:rPr>
+              <a:t> Observer();</a:t>
+            </a:r>
+          </a:p>
+          <a:p>
+            <a:r>
+              <a:rPr lang="en-US" sz="1600" dirty="0">
+                <a:solidFill>
+                  <a:srgbClr val="000000"/>
+                </a:solidFill>
+                <a:latin typeface="Times New Roman" panose="02020603050405020304" pitchFamily="18" charset="0"/>
+                <a:cs typeface="Times New Roman" panose="02020603050405020304" pitchFamily="18" charset="0"/>
+              </a:rPr>
+              <a:t>        Subject </a:t>
+            </a:r>
+            <a:r>
+              <a:rPr lang="en-US" sz="1600" dirty="0">
+                <a:solidFill>
+                  <a:srgbClr val="6A3E3E"/>
+                </a:solidFill>
+                <a:latin typeface="Times New Roman" panose="02020603050405020304" pitchFamily="18" charset="0"/>
+                <a:cs typeface="Times New Roman" panose="02020603050405020304" pitchFamily="18" charset="0"/>
+              </a:rPr>
+              <a:t>sub1</a:t>
+            </a:r>
+            <a:r>
+              <a:rPr lang="en-US" sz="1600" dirty="0">
+                <a:solidFill>
+                  <a:srgbClr val="000000"/>
+                </a:solidFill>
+                <a:latin typeface="Times New Roman" panose="02020603050405020304" pitchFamily="18" charset="0"/>
+                <a:cs typeface="Times New Roman" panose="02020603050405020304" pitchFamily="18" charset="0"/>
+              </a:rPr>
+              <a:t> = </a:t>
+            </a:r>
+            <a:r>
+              <a:rPr lang="en-US" sz="1600" b="1" dirty="0">
+                <a:solidFill>
+                  <a:srgbClr val="7F0055"/>
+                </a:solidFill>
+                <a:latin typeface="Times New Roman" panose="02020603050405020304" pitchFamily="18" charset="0"/>
+                <a:cs typeface="Times New Roman" panose="02020603050405020304" pitchFamily="18" charset="0"/>
+              </a:rPr>
+              <a:t>new</a:t>
+            </a:r>
+            <a:r>
+              <a:rPr lang="en-US" sz="1600" b="1" dirty="0">
+                <a:solidFill>
+                  <a:srgbClr val="000000"/>
+                </a:solidFill>
+                <a:latin typeface="Times New Roman" panose="02020603050405020304" pitchFamily="18" charset="0"/>
+                <a:cs typeface="Times New Roman" panose="02020603050405020304" pitchFamily="18" charset="0"/>
+              </a:rPr>
+              <a:t> Subject();</a:t>
+            </a:r>
+          </a:p>
+          <a:p>
+            <a:r>
+              <a:rPr lang="en-US" sz="1600" dirty="0">
+                <a:solidFill>
+                  <a:srgbClr val="000000"/>
+                </a:solidFill>
+                <a:latin typeface="Times New Roman" panose="02020603050405020304" pitchFamily="18" charset="0"/>
+                <a:cs typeface="Times New Roman" panose="02020603050405020304" pitchFamily="18" charset="0"/>
+              </a:rPr>
+              <a:t>        </a:t>
+            </a:r>
+            <a:r>
+              <a:rPr lang="en-US" sz="1600" dirty="0">
+                <a:solidFill>
+                  <a:srgbClr val="6A3E3E"/>
+                </a:solidFill>
+                <a:latin typeface="Times New Roman" panose="02020603050405020304" pitchFamily="18" charset="0"/>
+                <a:cs typeface="Times New Roman" panose="02020603050405020304" pitchFamily="18" charset="0"/>
+              </a:rPr>
+              <a:t>sub1</a:t>
+            </a:r>
+            <a:r>
+              <a:rPr lang="en-US" sz="1600" dirty="0">
+                <a:solidFill>
+                  <a:srgbClr val="000000"/>
+                </a:solidFill>
+                <a:latin typeface="Times New Roman" panose="02020603050405020304" pitchFamily="18" charset="0"/>
+                <a:cs typeface="Times New Roman" panose="02020603050405020304" pitchFamily="18" charset="0"/>
+              </a:rPr>
+              <a:t>.register(</a:t>
+            </a:r>
+            <a:r>
+              <a:rPr lang="en-US" sz="1600" dirty="0">
+                <a:solidFill>
+                  <a:srgbClr val="6A3E3E"/>
+                </a:solidFill>
+                <a:latin typeface="Times New Roman" panose="02020603050405020304" pitchFamily="18" charset="0"/>
+                <a:cs typeface="Times New Roman" panose="02020603050405020304" pitchFamily="18" charset="0"/>
+              </a:rPr>
+              <a:t>o1</a:t>
+            </a:r>
+            <a:r>
+              <a:rPr lang="en-US" sz="1600" dirty="0">
+                <a:solidFill>
+                  <a:srgbClr val="000000"/>
+                </a:solidFill>
+                <a:latin typeface="Times New Roman" panose="02020603050405020304" pitchFamily="18" charset="0"/>
+                <a:cs typeface="Times New Roman" panose="02020603050405020304" pitchFamily="18" charset="0"/>
+              </a:rPr>
+              <a:t>);</a:t>
+            </a:r>
+          </a:p>
+          <a:p>
+            <a:r>
+              <a:rPr lang="en-US" sz="1600" dirty="0">
+                <a:solidFill>
+                  <a:srgbClr val="000000"/>
+                </a:solidFill>
+                <a:latin typeface="Times New Roman" panose="02020603050405020304" pitchFamily="18" charset="0"/>
+                <a:cs typeface="Times New Roman" panose="02020603050405020304" pitchFamily="18" charset="0"/>
+              </a:rPr>
+              <a:t>        </a:t>
+            </a:r>
+            <a:r>
+              <a:rPr lang="en-US" sz="1600" dirty="0" err="1">
+                <a:solidFill>
+                  <a:srgbClr val="000000"/>
+                </a:solidFill>
+                <a:latin typeface="Times New Roman" panose="02020603050405020304" pitchFamily="18" charset="0"/>
+                <a:cs typeface="Times New Roman" panose="02020603050405020304" pitchFamily="18" charset="0"/>
+              </a:rPr>
+              <a:t>System.</a:t>
+            </a:r>
+            <a:r>
+              <a:rPr lang="en-US" sz="1600" b="1" i="1" dirty="0" err="1">
+                <a:solidFill>
+                  <a:srgbClr val="0000C0"/>
+                </a:solidFill>
+                <a:latin typeface="Times New Roman" panose="02020603050405020304" pitchFamily="18" charset="0"/>
+                <a:cs typeface="Times New Roman" panose="02020603050405020304" pitchFamily="18" charset="0"/>
+              </a:rPr>
+              <a:t>out</a:t>
+            </a:r>
+            <a:r>
+              <a:rPr lang="en-US" sz="1600" b="1" i="1" dirty="0" err="1">
+                <a:solidFill>
+                  <a:srgbClr val="000000"/>
+                </a:solidFill>
+                <a:latin typeface="Times New Roman" panose="02020603050405020304" pitchFamily="18" charset="0"/>
+                <a:cs typeface="Times New Roman" panose="02020603050405020304" pitchFamily="18" charset="0"/>
+              </a:rPr>
+              <a:t>.println</a:t>
+            </a:r>
+            <a:r>
+              <a:rPr lang="en-US" sz="1600" b="1" i="1" dirty="0">
+                <a:solidFill>
+                  <a:srgbClr val="000000"/>
+                </a:solidFill>
+                <a:latin typeface="Times New Roman" panose="02020603050405020304" pitchFamily="18" charset="0"/>
+                <a:cs typeface="Times New Roman" panose="02020603050405020304" pitchFamily="18" charset="0"/>
+              </a:rPr>
+              <a:t>(</a:t>
+            </a:r>
+            <a:r>
+              <a:rPr lang="en-US" sz="1600" b="1" i="1" dirty="0">
+                <a:solidFill>
+                  <a:srgbClr val="2A00FF"/>
+                </a:solidFill>
+                <a:latin typeface="Times New Roman" panose="02020603050405020304" pitchFamily="18" charset="0"/>
+                <a:cs typeface="Times New Roman" panose="02020603050405020304" pitchFamily="18" charset="0"/>
+              </a:rPr>
+              <a:t>"Setting Flag = 5 "</a:t>
+            </a:r>
+            <a:r>
+              <a:rPr lang="en-US" sz="1600" b="1" i="1" dirty="0">
+                <a:solidFill>
+                  <a:srgbClr val="000000"/>
+                </a:solidFill>
+                <a:latin typeface="Times New Roman" panose="02020603050405020304" pitchFamily="18" charset="0"/>
+                <a:cs typeface="Times New Roman" panose="02020603050405020304" pitchFamily="18" charset="0"/>
+              </a:rPr>
+              <a:t>);</a:t>
+            </a:r>
+          </a:p>
+          <a:p>
+            <a:r>
+              <a:rPr lang="en-US" sz="1600" dirty="0">
+                <a:solidFill>
+                  <a:srgbClr val="000000"/>
+                </a:solidFill>
+                <a:latin typeface="Times New Roman" panose="02020603050405020304" pitchFamily="18" charset="0"/>
+                <a:cs typeface="Times New Roman" panose="02020603050405020304" pitchFamily="18" charset="0"/>
+              </a:rPr>
+              <a:t>        </a:t>
+            </a:r>
+            <a:r>
+              <a:rPr lang="en-US" sz="1600" dirty="0">
+                <a:solidFill>
+                  <a:srgbClr val="6A3E3E"/>
+                </a:solidFill>
+                <a:latin typeface="Times New Roman" panose="02020603050405020304" pitchFamily="18" charset="0"/>
+                <a:cs typeface="Times New Roman" panose="02020603050405020304" pitchFamily="18" charset="0"/>
+              </a:rPr>
+              <a:t>sub1</a:t>
+            </a:r>
+            <a:r>
+              <a:rPr lang="en-US" sz="1600" dirty="0">
+                <a:solidFill>
+                  <a:srgbClr val="000000"/>
+                </a:solidFill>
+                <a:latin typeface="Times New Roman" panose="02020603050405020304" pitchFamily="18" charset="0"/>
+                <a:cs typeface="Times New Roman" panose="02020603050405020304" pitchFamily="18" charset="0"/>
+              </a:rPr>
+              <a:t>.setFlag(5);</a:t>
+            </a:r>
+          </a:p>
+          <a:p>
+            <a:r>
+              <a:rPr lang="en-US" sz="1600" dirty="0">
+                <a:solidFill>
+                  <a:srgbClr val="000000"/>
+                </a:solidFill>
+                <a:latin typeface="Times New Roman" panose="02020603050405020304" pitchFamily="18" charset="0"/>
+                <a:cs typeface="Times New Roman" panose="02020603050405020304" pitchFamily="18" charset="0"/>
+              </a:rPr>
+              <a:t>        </a:t>
+            </a:r>
+            <a:r>
+              <a:rPr lang="en-US" sz="1600" dirty="0" err="1">
+                <a:solidFill>
+                  <a:srgbClr val="000000"/>
+                </a:solidFill>
+                <a:latin typeface="Times New Roman" panose="02020603050405020304" pitchFamily="18" charset="0"/>
+                <a:cs typeface="Times New Roman" panose="02020603050405020304" pitchFamily="18" charset="0"/>
+              </a:rPr>
+              <a:t>System.</a:t>
+            </a:r>
+            <a:r>
+              <a:rPr lang="en-US" sz="1600" b="1" i="1" dirty="0" err="1">
+                <a:solidFill>
+                  <a:srgbClr val="0000C0"/>
+                </a:solidFill>
+                <a:latin typeface="Times New Roman" panose="02020603050405020304" pitchFamily="18" charset="0"/>
+                <a:cs typeface="Times New Roman" panose="02020603050405020304" pitchFamily="18" charset="0"/>
+              </a:rPr>
+              <a:t>out</a:t>
+            </a:r>
+            <a:r>
+              <a:rPr lang="en-US" sz="1600" b="1" i="1" dirty="0" err="1">
+                <a:solidFill>
+                  <a:srgbClr val="000000"/>
+                </a:solidFill>
+                <a:latin typeface="Times New Roman" panose="02020603050405020304" pitchFamily="18" charset="0"/>
+                <a:cs typeface="Times New Roman" panose="02020603050405020304" pitchFamily="18" charset="0"/>
+              </a:rPr>
+              <a:t>.println</a:t>
+            </a:r>
+            <a:r>
+              <a:rPr lang="en-US" sz="1600" b="1" i="1" dirty="0">
+                <a:solidFill>
+                  <a:srgbClr val="000000"/>
+                </a:solidFill>
+                <a:latin typeface="Times New Roman" panose="02020603050405020304" pitchFamily="18" charset="0"/>
+                <a:cs typeface="Times New Roman" panose="02020603050405020304" pitchFamily="18" charset="0"/>
+              </a:rPr>
+              <a:t>(</a:t>
+            </a:r>
+            <a:r>
+              <a:rPr lang="en-US" sz="1600" b="1" i="1" dirty="0">
+                <a:solidFill>
+                  <a:srgbClr val="2A00FF"/>
+                </a:solidFill>
+                <a:latin typeface="Times New Roman" panose="02020603050405020304" pitchFamily="18" charset="0"/>
+                <a:cs typeface="Times New Roman" panose="02020603050405020304" pitchFamily="18" charset="0"/>
+              </a:rPr>
+              <a:t>"Setting Flag = 25 "</a:t>
+            </a:r>
+            <a:r>
+              <a:rPr lang="en-US" sz="1600" b="1" i="1" dirty="0">
+                <a:solidFill>
+                  <a:srgbClr val="000000"/>
+                </a:solidFill>
+                <a:latin typeface="Times New Roman" panose="02020603050405020304" pitchFamily="18" charset="0"/>
+                <a:cs typeface="Times New Roman" panose="02020603050405020304" pitchFamily="18" charset="0"/>
+              </a:rPr>
+              <a:t>);</a:t>
+            </a:r>
+          </a:p>
+          <a:p>
+            <a:r>
+              <a:rPr lang="en-US" sz="1600" dirty="0">
+                <a:solidFill>
+                  <a:srgbClr val="000000"/>
+                </a:solidFill>
+                <a:latin typeface="Times New Roman" panose="02020603050405020304" pitchFamily="18" charset="0"/>
+                <a:cs typeface="Times New Roman" panose="02020603050405020304" pitchFamily="18" charset="0"/>
+              </a:rPr>
+              <a:t>        </a:t>
+            </a:r>
+            <a:r>
+              <a:rPr lang="en-US" sz="1600" dirty="0">
+                <a:solidFill>
+                  <a:srgbClr val="6A3E3E"/>
+                </a:solidFill>
+                <a:latin typeface="Times New Roman" panose="02020603050405020304" pitchFamily="18" charset="0"/>
+                <a:cs typeface="Times New Roman" panose="02020603050405020304" pitchFamily="18" charset="0"/>
+              </a:rPr>
+              <a:t>sub1</a:t>
+            </a:r>
+            <a:r>
+              <a:rPr lang="en-US" sz="1600" dirty="0">
+                <a:solidFill>
+                  <a:srgbClr val="000000"/>
+                </a:solidFill>
+                <a:latin typeface="Times New Roman" panose="02020603050405020304" pitchFamily="18" charset="0"/>
+                <a:cs typeface="Times New Roman" panose="02020603050405020304" pitchFamily="18" charset="0"/>
+              </a:rPr>
+              <a:t>.setFlag(25);</a:t>
+            </a:r>
+          </a:p>
+          <a:p>
+            <a:r>
+              <a:rPr lang="en-US" sz="1600" dirty="0">
+                <a:solidFill>
+                  <a:srgbClr val="000000"/>
+                </a:solidFill>
+                <a:latin typeface="Times New Roman" panose="02020603050405020304" pitchFamily="18" charset="0"/>
+                <a:cs typeface="Times New Roman" panose="02020603050405020304" pitchFamily="18" charset="0"/>
+              </a:rPr>
+              <a:t>        </a:t>
+            </a:r>
+            <a:r>
+              <a:rPr lang="en-US" sz="1600" dirty="0">
+                <a:solidFill>
+                  <a:srgbClr val="6A3E3E"/>
+                </a:solidFill>
+                <a:latin typeface="Times New Roman" panose="02020603050405020304" pitchFamily="18" charset="0"/>
+                <a:cs typeface="Times New Roman" panose="02020603050405020304" pitchFamily="18" charset="0"/>
+              </a:rPr>
+              <a:t>sub1</a:t>
+            </a:r>
+            <a:r>
+              <a:rPr lang="en-US" sz="1600" dirty="0">
+                <a:solidFill>
+                  <a:srgbClr val="000000"/>
+                </a:solidFill>
+                <a:latin typeface="Times New Roman" panose="02020603050405020304" pitchFamily="18" charset="0"/>
+                <a:cs typeface="Times New Roman" panose="02020603050405020304" pitchFamily="18" charset="0"/>
+              </a:rPr>
+              <a:t>.unregister(</a:t>
+            </a:r>
+            <a:r>
+              <a:rPr lang="en-US" sz="1600" dirty="0">
+                <a:solidFill>
+                  <a:srgbClr val="6A3E3E"/>
+                </a:solidFill>
+                <a:latin typeface="Times New Roman" panose="02020603050405020304" pitchFamily="18" charset="0"/>
+                <a:cs typeface="Times New Roman" panose="02020603050405020304" pitchFamily="18" charset="0"/>
+              </a:rPr>
+              <a:t>o1</a:t>
+            </a:r>
+            <a:r>
+              <a:rPr lang="en-US" sz="1600" dirty="0">
+                <a:solidFill>
+                  <a:srgbClr val="000000"/>
+                </a:solidFill>
+                <a:latin typeface="Times New Roman" panose="02020603050405020304" pitchFamily="18" charset="0"/>
+                <a:cs typeface="Times New Roman" panose="02020603050405020304" pitchFamily="18" charset="0"/>
+              </a:rPr>
+              <a:t>);</a:t>
+            </a:r>
+          </a:p>
+          <a:p>
+            <a:r>
+              <a:rPr lang="en-US" sz="1600" dirty="0">
+                <a:solidFill>
+                  <a:srgbClr val="000000"/>
+                </a:solidFill>
+                <a:latin typeface="Times New Roman" panose="02020603050405020304" pitchFamily="18" charset="0"/>
+                <a:cs typeface="Times New Roman" panose="02020603050405020304" pitchFamily="18" charset="0"/>
+              </a:rPr>
+              <a:t>        </a:t>
+            </a:r>
+            <a:r>
+              <a:rPr lang="en-US" sz="1600" dirty="0">
+                <a:solidFill>
+                  <a:srgbClr val="3F7F5F"/>
+                </a:solidFill>
+                <a:latin typeface="Times New Roman" panose="02020603050405020304" pitchFamily="18" charset="0"/>
+                <a:cs typeface="Times New Roman" panose="02020603050405020304" pitchFamily="18" charset="0"/>
+              </a:rPr>
+              <a:t>//No notification this time to o1 .Since it is unregistered.</a:t>
+            </a:r>
+          </a:p>
+          <a:p>
+            <a:r>
+              <a:rPr lang="en-US" sz="1600" dirty="0">
+                <a:solidFill>
+                  <a:srgbClr val="000000"/>
+                </a:solidFill>
+                <a:latin typeface="Times New Roman" panose="02020603050405020304" pitchFamily="18" charset="0"/>
+                <a:cs typeface="Times New Roman" panose="02020603050405020304" pitchFamily="18" charset="0"/>
+              </a:rPr>
+              <a:t>        </a:t>
+            </a:r>
+            <a:r>
+              <a:rPr lang="en-US" sz="1600" dirty="0" err="1">
+                <a:solidFill>
+                  <a:srgbClr val="000000"/>
+                </a:solidFill>
+                <a:latin typeface="Times New Roman" panose="02020603050405020304" pitchFamily="18" charset="0"/>
+                <a:cs typeface="Times New Roman" panose="02020603050405020304" pitchFamily="18" charset="0"/>
+              </a:rPr>
+              <a:t>System.</a:t>
+            </a:r>
+            <a:r>
+              <a:rPr lang="en-US" sz="1600" b="1" i="1" dirty="0" err="1">
+                <a:solidFill>
+                  <a:srgbClr val="0000C0"/>
+                </a:solidFill>
+                <a:latin typeface="Times New Roman" panose="02020603050405020304" pitchFamily="18" charset="0"/>
+                <a:cs typeface="Times New Roman" panose="02020603050405020304" pitchFamily="18" charset="0"/>
+              </a:rPr>
+              <a:t>out</a:t>
+            </a:r>
+            <a:r>
+              <a:rPr lang="en-US" sz="1600" b="1" i="1" dirty="0" err="1">
+                <a:solidFill>
+                  <a:srgbClr val="000000"/>
+                </a:solidFill>
+                <a:latin typeface="Times New Roman" panose="02020603050405020304" pitchFamily="18" charset="0"/>
+                <a:cs typeface="Times New Roman" panose="02020603050405020304" pitchFamily="18" charset="0"/>
+              </a:rPr>
+              <a:t>.println</a:t>
+            </a:r>
+            <a:r>
+              <a:rPr lang="en-US" sz="1600" b="1" i="1" dirty="0">
+                <a:solidFill>
+                  <a:srgbClr val="000000"/>
+                </a:solidFill>
+                <a:latin typeface="Times New Roman" panose="02020603050405020304" pitchFamily="18" charset="0"/>
+                <a:cs typeface="Times New Roman" panose="02020603050405020304" pitchFamily="18" charset="0"/>
+              </a:rPr>
+              <a:t>(</a:t>
+            </a:r>
+            <a:r>
+              <a:rPr lang="en-US" sz="1600" b="1" i="1" dirty="0">
+                <a:solidFill>
+                  <a:srgbClr val="2A00FF"/>
+                </a:solidFill>
+                <a:latin typeface="Times New Roman" panose="02020603050405020304" pitchFamily="18" charset="0"/>
+                <a:cs typeface="Times New Roman" panose="02020603050405020304" pitchFamily="18" charset="0"/>
+              </a:rPr>
+              <a:t>"Setting Flag = 50 "</a:t>
+            </a:r>
+            <a:r>
+              <a:rPr lang="en-US" sz="1600" b="1" i="1" dirty="0">
+                <a:solidFill>
+                  <a:srgbClr val="000000"/>
+                </a:solidFill>
+                <a:latin typeface="Times New Roman" panose="02020603050405020304" pitchFamily="18" charset="0"/>
+                <a:cs typeface="Times New Roman" panose="02020603050405020304" pitchFamily="18" charset="0"/>
+              </a:rPr>
+              <a:t>);</a:t>
+            </a:r>
+          </a:p>
+          <a:p>
+            <a:r>
+              <a:rPr lang="en-US" sz="1600" dirty="0">
+                <a:solidFill>
+                  <a:srgbClr val="000000"/>
+                </a:solidFill>
+                <a:latin typeface="Times New Roman" panose="02020603050405020304" pitchFamily="18" charset="0"/>
+                <a:cs typeface="Times New Roman" panose="02020603050405020304" pitchFamily="18" charset="0"/>
+              </a:rPr>
+              <a:t>        </a:t>
+            </a:r>
+            <a:r>
+              <a:rPr lang="en-US" sz="1600" dirty="0">
+                <a:solidFill>
+                  <a:srgbClr val="6A3E3E"/>
+                </a:solidFill>
+                <a:latin typeface="Times New Roman" panose="02020603050405020304" pitchFamily="18" charset="0"/>
+                <a:cs typeface="Times New Roman" panose="02020603050405020304" pitchFamily="18" charset="0"/>
+              </a:rPr>
+              <a:t>sub1</a:t>
+            </a:r>
+            <a:r>
+              <a:rPr lang="en-US" sz="1600" dirty="0">
+                <a:solidFill>
+                  <a:srgbClr val="000000"/>
+                </a:solidFill>
+                <a:latin typeface="Times New Roman" panose="02020603050405020304" pitchFamily="18" charset="0"/>
+                <a:cs typeface="Times New Roman" panose="02020603050405020304" pitchFamily="18" charset="0"/>
+              </a:rPr>
+              <a:t>.setFlag(50);        </a:t>
+            </a:r>
+          </a:p>
+          <a:p>
+            <a:r>
+              <a:rPr lang="en-US" sz="1600" dirty="0">
+                <a:solidFill>
+                  <a:srgbClr val="000000"/>
+                </a:solidFill>
+                <a:latin typeface="Times New Roman" panose="02020603050405020304" pitchFamily="18" charset="0"/>
+                <a:cs typeface="Times New Roman" panose="02020603050405020304" pitchFamily="18" charset="0"/>
+              </a:rPr>
+              <a:t>    }</a:t>
+            </a:r>
+          </a:p>
+          <a:p>
+            <a:r>
+              <a:rPr lang="en-US" sz="1600" dirty="0">
+                <a:solidFill>
+                  <a:srgbClr val="000000"/>
+                </a:solidFill>
+                <a:latin typeface="Times New Roman" panose="02020603050405020304" pitchFamily="18" charset="0"/>
+                <a:cs typeface="Times New Roman" panose="02020603050405020304" pitchFamily="18" charset="0"/>
+              </a:rPr>
+              <a:t>}</a:t>
+            </a:r>
+            <a:endParaRPr lang="en-US" sz="1600" dirty="0">
               <a:latin typeface="Times New Roman" panose="02020603050405020304" pitchFamily="18" charset="0"/>
               <a:cs typeface="Times New Roman" panose="02020603050405020304" pitchFamily="18" charset="0"/>
             </a:endParaRPr>
@@ -42935,6 +45558,13 @@
             </a:r>
           </a:p>
           <a:p>
+            <a:r>
+              <a:rPr lang="vi-VN" sz="3200" dirty="0">
+                <a:latin typeface="Times New Roman" panose="02020603050405020304" pitchFamily="18" charset="0"/>
+                <a:cs typeface="Times New Roman" panose="02020603050405020304" pitchFamily="18" charset="0"/>
+              </a:rPr>
+              <a:t/>
+            </a:r>
             <a:br>
               <a:rPr lang="vi-VN" sz="3200" dirty="0">
                 <a:latin typeface="Times New Roman" panose="02020603050405020304" pitchFamily="18" charset="0"/>

</xml_diff>